<commit_message>
adding the hole project without campaing managment & reprots
</commit_message>
<xml_diff>
--- a/مدمن.pptx بريزنتيشن.pptx
+++ b/مدمن.pptx بريزنتيشن.pptx
@@ -28,29 +28,28 @@
     <p:sldId id="273" r:id="rId23"/>
     <p:sldId id="274" r:id="rId24"/>
     <p:sldId id="275" r:id="rId25"/>
-    <p:sldId id="276" r:id="rId26"/>
   </p:sldIdLst>
   <p:sldSz cy="6858000" cx="12192000"/>
   <p:notesSz cx="6858000" cy="9144000"/>
   <p:embeddedFontLst>
     <p:embeddedFont>
       <p:font typeface="Play"/>
-      <p:regular r:id="rId27"/>
-      <p:bold r:id="rId28"/>
+      <p:regular r:id="rId26"/>
+      <p:bold r:id="rId27"/>
     </p:embeddedFont>
     <p:embeddedFont>
       <p:font typeface="Open Sans Light"/>
-      <p:regular r:id="rId29"/>
-      <p:bold r:id="rId30"/>
-      <p:italic r:id="rId31"/>
-      <p:boldItalic r:id="rId32"/>
+      <p:regular r:id="rId28"/>
+      <p:bold r:id="rId29"/>
+      <p:italic r:id="rId30"/>
+      <p:boldItalic r:id="rId31"/>
     </p:embeddedFont>
     <p:embeddedFont>
       <p:font typeface="Open Sans"/>
-      <p:regular r:id="rId33"/>
-      <p:bold r:id="rId34"/>
-      <p:italic r:id="rId35"/>
-      <p:boldItalic r:id="rId36"/>
+      <p:regular r:id="rId32"/>
+      <p:bold r:id="rId33"/>
+      <p:italic r:id="rId34"/>
+      <p:boldItalic r:id="rId35"/>
     </p:embeddedFont>
   </p:embeddedFontLst>
   <p:defaultTextStyle>
@@ -284,7 +283,7 @@
   </p:defaultTextStyle>
   <p:extLst>
     <p:ext uri="GoogleSlidesCustomDataVersion2">
-      <go:slidesCustomData xmlns:go="http://customooxmlschemas.google.com/" r:id="rId37" roundtripDataSignature="AMtx7miXZGR6yx4Y3HFmgUd0Ww9rsUNApw=="/>
+      <go:slidesCustomData xmlns:go="http://customooxmlschemas.google.com/" r:id="rId36" roundtripDataSignature="AMtx7mgBm7z8R2UXrZfl7nmgdf0Uz5N7hQ=="/>
     </p:ext>
   </p:extLst>
 </p:presentation>
@@ -2627,7 +2626,7 @@
       </p:grpSpPr>
       <p:sp>
         <p:nvSpPr>
-          <p:cNvPr id="203" name="Google Shape;203;p16:notes"/>
+          <p:cNvPr id="203" name="Google Shape;203;p14:notes"/>
           <p:cNvSpPr/>
           <p:nvPr>
             <p:ph idx="2" type="sldImg"/>
@@ -2672,7 +2671,7 @@
       </p:sp>
       <p:sp>
         <p:nvSpPr>
-          <p:cNvPr id="204" name="Google Shape;204;p16:notes"/>
+          <p:cNvPr id="204" name="Google Shape;204;p14:notes"/>
           <p:cNvSpPr txBox="1"/>
           <p:nvPr>
             <p:ph idx="1" type="body"/>
@@ -2723,7 +2722,7 @@
       </p:sp>
       <p:sp>
         <p:nvSpPr>
-          <p:cNvPr id="205" name="Google Shape;205;p16:notes"/>
+          <p:cNvPr id="205" name="Google Shape;205;p14:notes"/>
           <p:cNvSpPr txBox="1"/>
           <p:nvPr>
             <p:ph idx="12" type="sldNum"/>
@@ -2808,7 +2807,7 @@
       </p:grpSpPr>
       <p:sp>
         <p:nvSpPr>
-          <p:cNvPr id="209" name="Google Shape;209;p14:notes"/>
+          <p:cNvPr id="209" name="Google Shape;209;p15:notes"/>
           <p:cNvSpPr/>
           <p:nvPr>
             <p:ph idx="2" type="sldImg"/>
@@ -2853,7 +2852,7 @@
       </p:sp>
       <p:sp>
         <p:nvSpPr>
-          <p:cNvPr id="210" name="Google Shape;210;p14:notes"/>
+          <p:cNvPr id="210" name="Google Shape;210;p15:notes"/>
           <p:cNvSpPr txBox="1"/>
           <p:nvPr>
             <p:ph idx="1" type="body"/>
@@ -2904,7 +2903,7 @@
       </p:sp>
       <p:sp>
         <p:nvSpPr>
-          <p:cNvPr id="211" name="Google Shape;211;p14:notes"/>
+          <p:cNvPr id="211" name="Google Shape;211;p15:notes"/>
           <p:cNvSpPr txBox="1"/>
           <p:nvPr>
             <p:ph idx="12" type="sldNum"/>
@@ -2989,7 +2988,369 @@
       </p:grpSpPr>
       <p:sp>
         <p:nvSpPr>
-          <p:cNvPr id="215" name="Google Shape;215;p15:notes"/>
+          <p:cNvPr id="215" name="Google Shape;215;p17:notes"/>
+          <p:cNvSpPr/>
+          <p:nvPr>
+            <p:ph idx="2" type="sldImg"/>
+          </p:nvPr>
+        </p:nvSpPr>
+        <p:spPr>
+          <a:xfrm>
+            <a:off x="685800" y="1143000"/>
+            <a:ext cx="5486400" cy="3086099"/>
+          </a:xfrm>
+          <a:custGeom>
+            <a:rect b="b" l="l" r="r" t="t"/>
+            <a:pathLst>
+              <a:path extrusionOk="0" h="120000" w="120000">
+                <a:moveTo>
+                  <a:pt x="0" y="0"/>
+                </a:moveTo>
+                <a:lnTo>
+                  <a:pt x="120000" y="0"/>
+                </a:lnTo>
+                <a:lnTo>
+                  <a:pt x="120000" y="120000"/>
+                </a:lnTo>
+                <a:lnTo>
+                  <a:pt x="0" y="120000"/>
+                </a:lnTo>
+                <a:close/>
+              </a:path>
+            </a:pathLst>
+          </a:custGeom>
+          <a:noFill/>
+          <a:ln cap="flat" cmpd="sng" w="12700">
+            <a:solidFill>
+              <a:srgbClr val="000000"/>
+            </a:solidFill>
+            <a:prstDash val="solid"/>
+            <a:round/>
+            <a:headEnd len="sm" w="sm" type="none"/>
+            <a:tailEnd len="sm" w="sm" type="none"/>
+          </a:ln>
+        </p:spPr>
+      </p:sp>
+      <p:sp>
+        <p:nvSpPr>
+          <p:cNvPr id="216" name="Google Shape;216;p17:notes"/>
+          <p:cNvSpPr txBox="1"/>
+          <p:nvPr>
+            <p:ph idx="1" type="body"/>
+          </p:nvPr>
+        </p:nvSpPr>
+        <p:spPr>
+          <a:xfrm>
+            <a:off x="685800" y="4400549"/>
+            <a:ext cx="5486400" cy="3600450"/>
+          </a:xfrm>
+          <a:prstGeom prst="rect">
+            <a:avLst/>
+          </a:prstGeom>
+          <a:noFill/>
+          <a:ln>
+            <a:noFill/>
+          </a:ln>
+        </p:spPr>
+        <p:txBody>
+          <a:bodyPr anchorCtr="0" anchor="t" bIns="45700" lIns="91425" spcFirstLastPara="1" rIns="91425" wrap="square" tIns="45700">
+            <a:noAutofit/>
+          </a:bodyPr>
+          <a:lstStyle/>
+          <a:p>
+            <a:pPr indent="0" lvl="0" marL="0" rtl="0" algn="l">
+              <a:lnSpc>
+                <a:spcPct val="100000"/>
+              </a:lnSpc>
+              <a:spcBef>
+                <a:spcPts val="0"/>
+              </a:spcBef>
+              <a:spcAft>
+                <a:spcPts val="0"/>
+              </a:spcAft>
+              <a:buClr>
+                <a:srgbClr val="000000"/>
+              </a:buClr>
+              <a:buSzPts val="1200"/>
+              <a:buFont typeface="Calibri"/>
+              <a:buNone/>
+            </a:pPr>
+            <a:r>
+              <a:t/>
+            </a:r>
+            <a:endParaRPr/>
+          </a:p>
+        </p:txBody>
+      </p:sp>
+      <p:sp>
+        <p:nvSpPr>
+          <p:cNvPr id="217" name="Google Shape;217;p17:notes"/>
+          <p:cNvSpPr txBox="1"/>
+          <p:nvPr>
+            <p:ph idx="12" type="sldNum"/>
+          </p:nvPr>
+        </p:nvSpPr>
+        <p:spPr>
+          <a:xfrm>
+            <a:off x="3884608" y="8685208"/>
+            <a:ext cx="2971800" cy="458791"/>
+          </a:xfrm>
+          <a:prstGeom prst="rect">
+            <a:avLst/>
+          </a:prstGeom>
+          <a:noFill/>
+          <a:ln>
+            <a:noFill/>
+          </a:ln>
+        </p:spPr>
+        <p:txBody>
+          <a:bodyPr anchorCtr="0" anchor="b" bIns="45700" lIns="91425" spcFirstLastPara="1" rIns="91425" wrap="square" tIns="45700">
+            <a:noAutofit/>
+          </a:bodyPr>
+          <a:lstStyle/>
+          <a:p>
+            <a:pPr indent="0" lvl="0" marL="0" rtl="0" algn="r">
+              <a:lnSpc>
+                <a:spcPct val="100000"/>
+              </a:lnSpc>
+              <a:spcBef>
+                <a:spcPts val="0"/>
+              </a:spcBef>
+              <a:spcAft>
+                <a:spcPts val="0"/>
+              </a:spcAft>
+              <a:buClr>
+                <a:srgbClr val="000000"/>
+              </a:buClr>
+              <a:buSzPts val="1200"/>
+              <a:buFont typeface="Calibri"/>
+              <a:buNone/>
+            </a:pPr>
+            <a:fld id="{00000000-1234-1234-1234-123412341234}" type="slidenum">
+              <a:rPr b="0" i="0" lang="ar-AE" sz="1200" u="none" cap="none" strike="noStrike">
+                <a:solidFill>
+                  <a:srgbClr val="000000"/>
+                </a:solidFill>
+                <a:latin typeface="Calibri"/>
+                <a:ea typeface="Calibri"/>
+                <a:cs typeface="Calibri"/>
+                <a:sym typeface="Calibri"/>
+              </a:rPr>
+              <a:t>‹#›</a:t>
+            </a:fld>
+            <a:endParaRPr/>
+          </a:p>
+        </p:txBody>
+      </p:sp>
+    </p:spTree>
+  </p:cSld>
+  <p:clrMapOvr>
+    <a:masterClrMapping/>
+  </p:clrMapOvr>
+</p:notes>
+</file>
+
+<file path=ppt/notesSlides/notesSlide18.xml><?xml version="1.0" encoding="utf-8"?>
+<p:notes xmlns:a="http://schemas.openxmlformats.org/drawingml/2006/main" xmlns:r="http://schemas.openxmlformats.org/officeDocument/2006/relationships" xmlns:mc="http://schemas.openxmlformats.org/markup-compatibility/2006" xmlns:mv="urn:schemas-microsoft-com:mac:vml" xmlns:p="http://schemas.openxmlformats.org/presentationml/2006/main" xmlns:c="http://schemas.openxmlformats.org/drawingml/2006/chart" xmlns:dgm="http://schemas.openxmlformats.org/drawingml/2006/diagram" xmlns:o="urn:schemas-microsoft-com:office:office" xmlns:v="urn:schemas-microsoft-com:vml" xmlns:pvml="urn:schemas-microsoft-com:office:powerpoint" xmlns:com="http://schemas.openxmlformats.org/drawingml/2006/compatibility" xmlns:p14="http://schemas.microsoft.com/office/powerpoint/2010/main" xmlns:p15="http://schemas.microsoft.com/office/powerpoint/2012/main" xmlns:ahyp="http://schemas.microsoft.com/office/drawing/2018/hyperlinkcolor" showMasterPhAnim="0" showMasterSp="0">
+  <p:cSld>
+    <p:spTree>
+      <p:nvGrpSpPr>
+        <p:cNvPr id="221" name="Shape 221"/>
+        <p:cNvGrpSpPr/>
+        <p:nvPr/>
+      </p:nvGrpSpPr>
+      <p:grpSpPr>
+        <a:xfrm>
+          <a:off x="0" y="0"/>
+          <a:ext cx="0" cy="0"/>
+          <a:chOff x="0" y="0"/>
+          <a:chExt cx="0" cy="0"/>
+        </a:xfrm>
+      </p:grpSpPr>
+      <p:sp>
+        <p:nvSpPr>
+          <p:cNvPr id="222" name="Google Shape;222;p18:notes"/>
+          <p:cNvSpPr/>
+          <p:nvPr>
+            <p:ph idx="2" type="sldImg"/>
+          </p:nvPr>
+        </p:nvSpPr>
+        <p:spPr>
+          <a:xfrm>
+            <a:off x="685800" y="1143000"/>
+            <a:ext cx="5486400" cy="3086099"/>
+          </a:xfrm>
+          <a:custGeom>
+            <a:rect b="b" l="l" r="r" t="t"/>
+            <a:pathLst>
+              <a:path extrusionOk="0" h="120000" w="120000">
+                <a:moveTo>
+                  <a:pt x="0" y="0"/>
+                </a:moveTo>
+                <a:lnTo>
+                  <a:pt x="120000" y="0"/>
+                </a:lnTo>
+                <a:lnTo>
+                  <a:pt x="120000" y="120000"/>
+                </a:lnTo>
+                <a:lnTo>
+                  <a:pt x="0" y="120000"/>
+                </a:lnTo>
+                <a:close/>
+              </a:path>
+            </a:pathLst>
+          </a:custGeom>
+          <a:noFill/>
+          <a:ln cap="flat" cmpd="sng" w="12700">
+            <a:solidFill>
+              <a:srgbClr val="000000"/>
+            </a:solidFill>
+            <a:prstDash val="solid"/>
+            <a:round/>
+            <a:headEnd len="sm" w="sm" type="none"/>
+            <a:tailEnd len="sm" w="sm" type="none"/>
+          </a:ln>
+        </p:spPr>
+      </p:sp>
+      <p:sp>
+        <p:nvSpPr>
+          <p:cNvPr id="223" name="Google Shape;223;p18:notes"/>
+          <p:cNvSpPr txBox="1"/>
+          <p:nvPr>
+            <p:ph idx="1" type="body"/>
+          </p:nvPr>
+        </p:nvSpPr>
+        <p:spPr>
+          <a:xfrm>
+            <a:off x="685800" y="4400549"/>
+            <a:ext cx="5486400" cy="3600450"/>
+          </a:xfrm>
+          <a:prstGeom prst="rect">
+            <a:avLst/>
+          </a:prstGeom>
+          <a:noFill/>
+          <a:ln>
+            <a:noFill/>
+          </a:ln>
+        </p:spPr>
+        <p:txBody>
+          <a:bodyPr anchorCtr="0" anchor="t" bIns="45700" lIns="91425" spcFirstLastPara="1" rIns="91425" wrap="square" tIns="45700">
+            <a:noAutofit/>
+          </a:bodyPr>
+          <a:lstStyle/>
+          <a:p>
+            <a:pPr indent="0" lvl="0" marL="0" rtl="0" algn="l">
+              <a:lnSpc>
+                <a:spcPct val="100000"/>
+              </a:lnSpc>
+              <a:spcBef>
+                <a:spcPts val="0"/>
+              </a:spcBef>
+              <a:spcAft>
+                <a:spcPts val="0"/>
+              </a:spcAft>
+              <a:buClr>
+                <a:srgbClr val="000000"/>
+              </a:buClr>
+              <a:buSzPts val="1200"/>
+              <a:buFont typeface="Calibri"/>
+              <a:buNone/>
+            </a:pPr>
+            <a:r>
+              <a:t/>
+            </a:r>
+            <a:endParaRPr/>
+          </a:p>
+        </p:txBody>
+      </p:sp>
+      <p:sp>
+        <p:nvSpPr>
+          <p:cNvPr id="224" name="Google Shape;224;p18:notes"/>
+          <p:cNvSpPr txBox="1"/>
+          <p:nvPr>
+            <p:ph idx="12" type="sldNum"/>
+          </p:nvPr>
+        </p:nvSpPr>
+        <p:spPr>
+          <a:xfrm>
+            <a:off x="3884608" y="8685208"/>
+            <a:ext cx="2971800" cy="458791"/>
+          </a:xfrm>
+          <a:prstGeom prst="rect">
+            <a:avLst/>
+          </a:prstGeom>
+          <a:noFill/>
+          <a:ln>
+            <a:noFill/>
+          </a:ln>
+        </p:spPr>
+        <p:txBody>
+          <a:bodyPr anchorCtr="0" anchor="b" bIns="45700" lIns="91425" spcFirstLastPara="1" rIns="91425" wrap="square" tIns="45700">
+            <a:noAutofit/>
+          </a:bodyPr>
+          <a:lstStyle/>
+          <a:p>
+            <a:pPr indent="0" lvl="0" marL="0" rtl="0" algn="r">
+              <a:lnSpc>
+                <a:spcPct val="100000"/>
+              </a:lnSpc>
+              <a:spcBef>
+                <a:spcPts val="0"/>
+              </a:spcBef>
+              <a:spcAft>
+                <a:spcPts val="0"/>
+              </a:spcAft>
+              <a:buClr>
+                <a:srgbClr val="000000"/>
+              </a:buClr>
+              <a:buSzPts val="1200"/>
+              <a:buFont typeface="Calibri"/>
+              <a:buNone/>
+            </a:pPr>
+            <a:fld id="{00000000-1234-1234-1234-123412341234}" type="slidenum">
+              <a:rPr b="0" i="0" lang="ar-AE" sz="1200" u="none" cap="none" strike="noStrike">
+                <a:solidFill>
+                  <a:srgbClr val="000000"/>
+                </a:solidFill>
+                <a:latin typeface="Calibri"/>
+                <a:ea typeface="Calibri"/>
+                <a:cs typeface="Calibri"/>
+                <a:sym typeface="Calibri"/>
+              </a:rPr>
+              <a:t>‹#›</a:t>
+            </a:fld>
+            <a:endParaRPr/>
+          </a:p>
+        </p:txBody>
+      </p:sp>
+    </p:spTree>
+  </p:cSld>
+  <p:clrMapOvr>
+    <a:masterClrMapping/>
+  </p:clrMapOvr>
+</p:notes>
+</file>
+
+<file path=ppt/notesSlides/notesSlide19.xml><?xml version="1.0" encoding="utf-8"?>
+<p:notes xmlns:a="http://schemas.openxmlformats.org/drawingml/2006/main" xmlns:r="http://schemas.openxmlformats.org/officeDocument/2006/relationships" xmlns:mc="http://schemas.openxmlformats.org/markup-compatibility/2006" xmlns:mv="urn:schemas-microsoft-com:mac:vml" xmlns:p="http://schemas.openxmlformats.org/presentationml/2006/main" xmlns:c="http://schemas.openxmlformats.org/drawingml/2006/chart" xmlns:dgm="http://schemas.openxmlformats.org/drawingml/2006/diagram" xmlns:o="urn:schemas-microsoft-com:office:office" xmlns:v="urn:schemas-microsoft-com:vml" xmlns:pvml="urn:schemas-microsoft-com:office:powerpoint" xmlns:com="http://schemas.openxmlformats.org/drawingml/2006/compatibility" xmlns:p14="http://schemas.microsoft.com/office/powerpoint/2010/main" xmlns:p15="http://schemas.microsoft.com/office/powerpoint/2012/main" xmlns:ahyp="http://schemas.microsoft.com/office/drawing/2018/hyperlinkcolor" showMasterPhAnim="0" showMasterSp="0">
+  <p:cSld>
+    <p:spTree>
+      <p:nvGrpSpPr>
+        <p:cNvPr id="240" name="Shape 240"/>
+        <p:cNvGrpSpPr/>
+        <p:nvPr/>
+      </p:nvGrpSpPr>
+      <p:grpSpPr>
+        <a:xfrm>
+          <a:off x="0" y="0"/>
+          <a:ext cx="0" cy="0"/>
+          <a:chOff x="0" y="0"/>
+          <a:chExt cx="0" cy="0"/>
+        </a:xfrm>
+      </p:grpSpPr>
+      <p:sp>
+        <p:nvSpPr>
+          <p:cNvPr id="241" name="Google Shape;241;p19:notes"/>
           <p:cNvSpPr/>
           <p:nvPr>
             <p:ph idx="2" type="sldImg"/>
@@ -3034,7 +3395,7 @@
       </p:sp>
       <p:sp>
         <p:nvSpPr>
-          <p:cNvPr id="216" name="Google Shape;216;p15:notes"/>
+          <p:cNvPr id="242" name="Google Shape;242;p19:notes"/>
           <p:cNvSpPr txBox="1"/>
           <p:nvPr>
             <p:ph idx="1" type="body"/>
@@ -3085,369 +3446,7 @@
       </p:sp>
       <p:sp>
         <p:nvSpPr>
-          <p:cNvPr id="217" name="Google Shape;217;p15:notes"/>
-          <p:cNvSpPr txBox="1"/>
-          <p:nvPr>
-            <p:ph idx="12" type="sldNum"/>
-          </p:nvPr>
-        </p:nvSpPr>
-        <p:spPr>
-          <a:xfrm>
-            <a:off x="3884608" y="8685208"/>
-            <a:ext cx="2971800" cy="458791"/>
-          </a:xfrm>
-          <a:prstGeom prst="rect">
-            <a:avLst/>
-          </a:prstGeom>
-          <a:noFill/>
-          <a:ln>
-            <a:noFill/>
-          </a:ln>
-        </p:spPr>
-        <p:txBody>
-          <a:bodyPr anchorCtr="0" anchor="b" bIns="45700" lIns="91425" spcFirstLastPara="1" rIns="91425" wrap="square" tIns="45700">
-            <a:noAutofit/>
-          </a:bodyPr>
-          <a:lstStyle/>
-          <a:p>
-            <a:pPr indent="0" lvl="0" marL="0" rtl="0" algn="r">
-              <a:lnSpc>
-                <a:spcPct val="100000"/>
-              </a:lnSpc>
-              <a:spcBef>
-                <a:spcPts val="0"/>
-              </a:spcBef>
-              <a:spcAft>
-                <a:spcPts val="0"/>
-              </a:spcAft>
-              <a:buClr>
-                <a:srgbClr val="000000"/>
-              </a:buClr>
-              <a:buSzPts val="1200"/>
-              <a:buFont typeface="Calibri"/>
-              <a:buNone/>
-            </a:pPr>
-            <a:fld id="{00000000-1234-1234-1234-123412341234}" type="slidenum">
-              <a:rPr b="0" i="0" lang="ar-AE" sz="1200" u="none" cap="none" strike="noStrike">
-                <a:solidFill>
-                  <a:srgbClr val="000000"/>
-                </a:solidFill>
-                <a:latin typeface="Calibri"/>
-                <a:ea typeface="Calibri"/>
-                <a:cs typeface="Calibri"/>
-                <a:sym typeface="Calibri"/>
-              </a:rPr>
-              <a:t>‹#›</a:t>
-            </a:fld>
-            <a:endParaRPr/>
-          </a:p>
-        </p:txBody>
-      </p:sp>
-    </p:spTree>
-  </p:cSld>
-  <p:clrMapOvr>
-    <a:masterClrMapping/>
-  </p:clrMapOvr>
-</p:notes>
-</file>
-
-<file path=ppt/notesSlides/notesSlide18.xml><?xml version="1.0" encoding="utf-8"?>
-<p:notes xmlns:a="http://schemas.openxmlformats.org/drawingml/2006/main" xmlns:r="http://schemas.openxmlformats.org/officeDocument/2006/relationships" xmlns:mc="http://schemas.openxmlformats.org/markup-compatibility/2006" xmlns:mv="urn:schemas-microsoft-com:mac:vml" xmlns:p="http://schemas.openxmlformats.org/presentationml/2006/main" xmlns:c="http://schemas.openxmlformats.org/drawingml/2006/chart" xmlns:dgm="http://schemas.openxmlformats.org/drawingml/2006/diagram" xmlns:o="urn:schemas-microsoft-com:office:office" xmlns:v="urn:schemas-microsoft-com:vml" xmlns:pvml="urn:schemas-microsoft-com:office:powerpoint" xmlns:com="http://schemas.openxmlformats.org/drawingml/2006/compatibility" xmlns:p14="http://schemas.microsoft.com/office/powerpoint/2010/main" xmlns:p15="http://schemas.microsoft.com/office/powerpoint/2012/main" xmlns:ahyp="http://schemas.microsoft.com/office/drawing/2018/hyperlinkcolor" showMasterPhAnim="0" showMasterSp="0">
-  <p:cSld>
-    <p:spTree>
-      <p:nvGrpSpPr>
-        <p:cNvPr id="220" name="Shape 220"/>
-        <p:cNvGrpSpPr/>
-        <p:nvPr/>
-      </p:nvGrpSpPr>
-      <p:grpSpPr>
-        <a:xfrm>
-          <a:off x="0" y="0"/>
-          <a:ext cx="0" cy="0"/>
-          <a:chOff x="0" y="0"/>
-          <a:chExt cx="0" cy="0"/>
-        </a:xfrm>
-      </p:grpSpPr>
-      <p:sp>
-        <p:nvSpPr>
-          <p:cNvPr id="221" name="Google Shape;221;p17:notes"/>
-          <p:cNvSpPr/>
-          <p:nvPr>
-            <p:ph idx="2" type="sldImg"/>
-          </p:nvPr>
-        </p:nvSpPr>
-        <p:spPr>
-          <a:xfrm>
-            <a:off x="685800" y="1143000"/>
-            <a:ext cx="5486400" cy="3086099"/>
-          </a:xfrm>
-          <a:custGeom>
-            <a:rect b="b" l="l" r="r" t="t"/>
-            <a:pathLst>
-              <a:path extrusionOk="0" h="120000" w="120000">
-                <a:moveTo>
-                  <a:pt x="0" y="0"/>
-                </a:moveTo>
-                <a:lnTo>
-                  <a:pt x="120000" y="0"/>
-                </a:lnTo>
-                <a:lnTo>
-                  <a:pt x="120000" y="120000"/>
-                </a:lnTo>
-                <a:lnTo>
-                  <a:pt x="0" y="120000"/>
-                </a:lnTo>
-                <a:close/>
-              </a:path>
-            </a:pathLst>
-          </a:custGeom>
-          <a:noFill/>
-          <a:ln cap="flat" cmpd="sng" w="12700">
-            <a:solidFill>
-              <a:srgbClr val="000000"/>
-            </a:solidFill>
-            <a:prstDash val="solid"/>
-            <a:round/>
-            <a:headEnd len="sm" w="sm" type="none"/>
-            <a:tailEnd len="sm" w="sm" type="none"/>
-          </a:ln>
-        </p:spPr>
-      </p:sp>
-      <p:sp>
-        <p:nvSpPr>
-          <p:cNvPr id="222" name="Google Shape;222;p17:notes"/>
-          <p:cNvSpPr txBox="1"/>
-          <p:nvPr>
-            <p:ph idx="1" type="body"/>
-          </p:nvPr>
-        </p:nvSpPr>
-        <p:spPr>
-          <a:xfrm>
-            <a:off x="685800" y="4400549"/>
-            <a:ext cx="5486400" cy="3600450"/>
-          </a:xfrm>
-          <a:prstGeom prst="rect">
-            <a:avLst/>
-          </a:prstGeom>
-          <a:noFill/>
-          <a:ln>
-            <a:noFill/>
-          </a:ln>
-        </p:spPr>
-        <p:txBody>
-          <a:bodyPr anchorCtr="0" anchor="t" bIns="45700" lIns="91425" spcFirstLastPara="1" rIns="91425" wrap="square" tIns="45700">
-            <a:noAutofit/>
-          </a:bodyPr>
-          <a:lstStyle/>
-          <a:p>
-            <a:pPr indent="0" lvl="0" marL="0" rtl="0" algn="l">
-              <a:lnSpc>
-                <a:spcPct val="100000"/>
-              </a:lnSpc>
-              <a:spcBef>
-                <a:spcPts val="0"/>
-              </a:spcBef>
-              <a:spcAft>
-                <a:spcPts val="0"/>
-              </a:spcAft>
-              <a:buClr>
-                <a:srgbClr val="000000"/>
-              </a:buClr>
-              <a:buSzPts val="1200"/>
-              <a:buFont typeface="Calibri"/>
-              <a:buNone/>
-            </a:pPr>
-            <a:r>
-              <a:t/>
-            </a:r>
-            <a:endParaRPr/>
-          </a:p>
-        </p:txBody>
-      </p:sp>
-      <p:sp>
-        <p:nvSpPr>
-          <p:cNvPr id="223" name="Google Shape;223;p17:notes"/>
-          <p:cNvSpPr txBox="1"/>
-          <p:nvPr>
-            <p:ph idx="12" type="sldNum"/>
-          </p:nvPr>
-        </p:nvSpPr>
-        <p:spPr>
-          <a:xfrm>
-            <a:off x="3884608" y="8685208"/>
-            <a:ext cx="2971800" cy="458791"/>
-          </a:xfrm>
-          <a:prstGeom prst="rect">
-            <a:avLst/>
-          </a:prstGeom>
-          <a:noFill/>
-          <a:ln>
-            <a:noFill/>
-          </a:ln>
-        </p:spPr>
-        <p:txBody>
-          <a:bodyPr anchorCtr="0" anchor="b" bIns="45700" lIns="91425" spcFirstLastPara="1" rIns="91425" wrap="square" tIns="45700">
-            <a:noAutofit/>
-          </a:bodyPr>
-          <a:lstStyle/>
-          <a:p>
-            <a:pPr indent="0" lvl="0" marL="0" rtl="0" algn="r">
-              <a:lnSpc>
-                <a:spcPct val="100000"/>
-              </a:lnSpc>
-              <a:spcBef>
-                <a:spcPts val="0"/>
-              </a:spcBef>
-              <a:spcAft>
-                <a:spcPts val="0"/>
-              </a:spcAft>
-              <a:buClr>
-                <a:srgbClr val="000000"/>
-              </a:buClr>
-              <a:buSzPts val="1200"/>
-              <a:buFont typeface="Calibri"/>
-              <a:buNone/>
-            </a:pPr>
-            <a:fld id="{00000000-1234-1234-1234-123412341234}" type="slidenum">
-              <a:rPr b="0" i="0" lang="ar-AE" sz="1200" u="none" cap="none" strike="noStrike">
-                <a:solidFill>
-                  <a:srgbClr val="000000"/>
-                </a:solidFill>
-                <a:latin typeface="Calibri"/>
-                <a:ea typeface="Calibri"/>
-                <a:cs typeface="Calibri"/>
-                <a:sym typeface="Calibri"/>
-              </a:rPr>
-              <a:t>‹#›</a:t>
-            </a:fld>
-            <a:endParaRPr/>
-          </a:p>
-        </p:txBody>
-      </p:sp>
-    </p:spTree>
-  </p:cSld>
-  <p:clrMapOvr>
-    <a:masterClrMapping/>
-  </p:clrMapOvr>
-</p:notes>
-</file>
-
-<file path=ppt/notesSlides/notesSlide19.xml><?xml version="1.0" encoding="utf-8"?>
-<p:notes xmlns:a="http://schemas.openxmlformats.org/drawingml/2006/main" xmlns:r="http://schemas.openxmlformats.org/officeDocument/2006/relationships" xmlns:mc="http://schemas.openxmlformats.org/markup-compatibility/2006" xmlns:mv="urn:schemas-microsoft-com:mac:vml" xmlns:p="http://schemas.openxmlformats.org/presentationml/2006/main" xmlns:c="http://schemas.openxmlformats.org/drawingml/2006/chart" xmlns:dgm="http://schemas.openxmlformats.org/drawingml/2006/diagram" xmlns:o="urn:schemas-microsoft-com:office:office" xmlns:v="urn:schemas-microsoft-com:vml" xmlns:pvml="urn:schemas-microsoft-com:office:powerpoint" xmlns:com="http://schemas.openxmlformats.org/drawingml/2006/compatibility" xmlns:p14="http://schemas.microsoft.com/office/powerpoint/2010/main" xmlns:p15="http://schemas.microsoft.com/office/powerpoint/2012/main" xmlns:ahyp="http://schemas.microsoft.com/office/drawing/2018/hyperlinkcolor" showMasterPhAnim="0" showMasterSp="0">
-  <p:cSld>
-    <p:spTree>
-      <p:nvGrpSpPr>
-        <p:cNvPr id="227" name="Shape 227"/>
-        <p:cNvGrpSpPr/>
-        <p:nvPr/>
-      </p:nvGrpSpPr>
-      <p:grpSpPr>
-        <a:xfrm>
-          <a:off x="0" y="0"/>
-          <a:ext cx="0" cy="0"/>
-          <a:chOff x="0" y="0"/>
-          <a:chExt cx="0" cy="0"/>
-        </a:xfrm>
-      </p:grpSpPr>
-      <p:sp>
-        <p:nvSpPr>
-          <p:cNvPr id="228" name="Google Shape;228;p18:notes"/>
-          <p:cNvSpPr/>
-          <p:nvPr>
-            <p:ph idx="2" type="sldImg"/>
-          </p:nvPr>
-        </p:nvSpPr>
-        <p:spPr>
-          <a:xfrm>
-            <a:off x="685800" y="1143000"/>
-            <a:ext cx="5486400" cy="3086099"/>
-          </a:xfrm>
-          <a:custGeom>
-            <a:rect b="b" l="l" r="r" t="t"/>
-            <a:pathLst>
-              <a:path extrusionOk="0" h="120000" w="120000">
-                <a:moveTo>
-                  <a:pt x="0" y="0"/>
-                </a:moveTo>
-                <a:lnTo>
-                  <a:pt x="120000" y="0"/>
-                </a:lnTo>
-                <a:lnTo>
-                  <a:pt x="120000" y="120000"/>
-                </a:lnTo>
-                <a:lnTo>
-                  <a:pt x="0" y="120000"/>
-                </a:lnTo>
-                <a:close/>
-              </a:path>
-            </a:pathLst>
-          </a:custGeom>
-          <a:noFill/>
-          <a:ln cap="flat" cmpd="sng" w="12700">
-            <a:solidFill>
-              <a:srgbClr val="000000"/>
-            </a:solidFill>
-            <a:prstDash val="solid"/>
-            <a:round/>
-            <a:headEnd len="sm" w="sm" type="none"/>
-            <a:tailEnd len="sm" w="sm" type="none"/>
-          </a:ln>
-        </p:spPr>
-      </p:sp>
-      <p:sp>
-        <p:nvSpPr>
-          <p:cNvPr id="229" name="Google Shape;229;p18:notes"/>
-          <p:cNvSpPr txBox="1"/>
-          <p:nvPr>
-            <p:ph idx="1" type="body"/>
-          </p:nvPr>
-        </p:nvSpPr>
-        <p:spPr>
-          <a:xfrm>
-            <a:off x="685800" y="4400549"/>
-            <a:ext cx="5486400" cy="3600450"/>
-          </a:xfrm>
-          <a:prstGeom prst="rect">
-            <a:avLst/>
-          </a:prstGeom>
-          <a:noFill/>
-          <a:ln>
-            <a:noFill/>
-          </a:ln>
-        </p:spPr>
-        <p:txBody>
-          <a:bodyPr anchorCtr="0" anchor="t" bIns="45700" lIns="91425" spcFirstLastPara="1" rIns="91425" wrap="square" tIns="45700">
-            <a:noAutofit/>
-          </a:bodyPr>
-          <a:lstStyle/>
-          <a:p>
-            <a:pPr indent="0" lvl="0" marL="0" rtl="0" algn="l">
-              <a:lnSpc>
-                <a:spcPct val="100000"/>
-              </a:lnSpc>
-              <a:spcBef>
-                <a:spcPts val="0"/>
-              </a:spcBef>
-              <a:spcAft>
-                <a:spcPts val="0"/>
-              </a:spcAft>
-              <a:buClr>
-                <a:srgbClr val="000000"/>
-              </a:buClr>
-              <a:buSzPts val="1200"/>
-              <a:buFont typeface="Calibri"/>
-              <a:buNone/>
-            </a:pPr>
-            <a:r>
-              <a:t/>
-            </a:r>
-            <a:endParaRPr/>
-          </a:p>
-        </p:txBody>
-      </p:sp>
-      <p:sp>
-        <p:nvSpPr>
-          <p:cNvPr id="230" name="Google Shape;230;p18:notes"/>
+          <p:cNvPr id="243" name="Google Shape;243;p19:notes"/>
           <p:cNvSpPr txBox="1"/>
           <p:nvPr>
             <p:ph idx="12" type="sldNum"/>
@@ -3699,7 +3698,7 @@
   <p:cSld>
     <p:spTree>
       <p:nvGrpSpPr>
-        <p:cNvPr id="246" name="Shape 246"/>
+        <p:cNvPr id="259" name="Shape 259"/>
         <p:cNvGrpSpPr/>
         <p:nvPr/>
       </p:nvGrpSpPr>
@@ -3713,188 +3712,7 @@
       </p:grpSpPr>
       <p:sp>
         <p:nvSpPr>
-          <p:cNvPr id="247" name="Google Shape;247;p19:notes"/>
-          <p:cNvSpPr/>
-          <p:nvPr>
-            <p:ph idx="2" type="sldImg"/>
-          </p:nvPr>
-        </p:nvSpPr>
-        <p:spPr>
-          <a:xfrm>
-            <a:off x="685800" y="1143000"/>
-            <a:ext cx="5486400" cy="3086100"/>
-          </a:xfrm>
-          <a:custGeom>
-            <a:rect b="b" l="l" r="r" t="t"/>
-            <a:pathLst>
-              <a:path extrusionOk="0" h="120000" w="120000">
-                <a:moveTo>
-                  <a:pt x="0" y="0"/>
-                </a:moveTo>
-                <a:lnTo>
-                  <a:pt x="120000" y="0"/>
-                </a:lnTo>
-                <a:lnTo>
-                  <a:pt x="120000" y="120000"/>
-                </a:lnTo>
-                <a:lnTo>
-                  <a:pt x="0" y="120000"/>
-                </a:lnTo>
-                <a:close/>
-              </a:path>
-            </a:pathLst>
-          </a:custGeom>
-          <a:noFill/>
-          <a:ln cap="flat" cmpd="sng" w="12700">
-            <a:solidFill>
-              <a:srgbClr val="000000"/>
-            </a:solidFill>
-            <a:prstDash val="solid"/>
-            <a:round/>
-            <a:headEnd len="sm" w="sm" type="none"/>
-            <a:tailEnd len="sm" w="sm" type="none"/>
-          </a:ln>
-        </p:spPr>
-      </p:sp>
-      <p:sp>
-        <p:nvSpPr>
-          <p:cNvPr id="248" name="Google Shape;248;p19:notes"/>
-          <p:cNvSpPr txBox="1"/>
-          <p:nvPr>
-            <p:ph idx="1" type="body"/>
-          </p:nvPr>
-        </p:nvSpPr>
-        <p:spPr>
-          <a:xfrm>
-            <a:off x="685800" y="4400549"/>
-            <a:ext cx="5486400" cy="3600450"/>
-          </a:xfrm>
-          <a:prstGeom prst="rect">
-            <a:avLst/>
-          </a:prstGeom>
-          <a:noFill/>
-          <a:ln>
-            <a:noFill/>
-          </a:ln>
-        </p:spPr>
-        <p:txBody>
-          <a:bodyPr anchorCtr="0" anchor="t" bIns="45700" lIns="91425" spcFirstLastPara="1" rIns="91425" wrap="square" tIns="45700">
-            <a:noAutofit/>
-          </a:bodyPr>
-          <a:lstStyle/>
-          <a:p>
-            <a:pPr indent="0" lvl="0" marL="0" rtl="0" algn="l">
-              <a:lnSpc>
-                <a:spcPct val="100000"/>
-              </a:lnSpc>
-              <a:spcBef>
-                <a:spcPts val="0"/>
-              </a:spcBef>
-              <a:spcAft>
-                <a:spcPts val="0"/>
-              </a:spcAft>
-              <a:buClr>
-                <a:srgbClr val="000000"/>
-              </a:buClr>
-              <a:buSzPts val="1200"/>
-              <a:buFont typeface="Calibri"/>
-              <a:buNone/>
-            </a:pPr>
-            <a:r>
-              <a:t/>
-            </a:r>
-            <a:endParaRPr/>
-          </a:p>
-        </p:txBody>
-      </p:sp>
-      <p:sp>
-        <p:nvSpPr>
-          <p:cNvPr id="249" name="Google Shape;249;p19:notes"/>
-          <p:cNvSpPr txBox="1"/>
-          <p:nvPr>
-            <p:ph idx="12" type="sldNum"/>
-          </p:nvPr>
-        </p:nvSpPr>
-        <p:spPr>
-          <a:xfrm>
-            <a:off x="3884608" y="8685208"/>
-            <a:ext cx="2971800" cy="458791"/>
-          </a:xfrm>
-          <a:prstGeom prst="rect">
-            <a:avLst/>
-          </a:prstGeom>
-          <a:noFill/>
-          <a:ln>
-            <a:noFill/>
-          </a:ln>
-        </p:spPr>
-        <p:txBody>
-          <a:bodyPr anchorCtr="0" anchor="b" bIns="45700" lIns="91425" spcFirstLastPara="1" rIns="91425" wrap="square" tIns="45700">
-            <a:noAutofit/>
-          </a:bodyPr>
-          <a:lstStyle/>
-          <a:p>
-            <a:pPr indent="0" lvl="0" marL="0" rtl="0" algn="r">
-              <a:lnSpc>
-                <a:spcPct val="100000"/>
-              </a:lnSpc>
-              <a:spcBef>
-                <a:spcPts val="0"/>
-              </a:spcBef>
-              <a:spcAft>
-                <a:spcPts val="0"/>
-              </a:spcAft>
-              <a:buClr>
-                <a:srgbClr val="000000"/>
-              </a:buClr>
-              <a:buSzPts val="1200"/>
-              <a:buFont typeface="Calibri"/>
-              <a:buNone/>
-            </a:pPr>
-            <a:fld id="{00000000-1234-1234-1234-123412341234}" type="slidenum">
-              <a:rPr b="0" i="0" lang="ar-AE" sz="1200" u="none" cap="none" strike="noStrike">
-                <a:solidFill>
-                  <a:srgbClr val="000000"/>
-                </a:solidFill>
-                <a:latin typeface="Calibri"/>
-                <a:ea typeface="Calibri"/>
-                <a:cs typeface="Calibri"/>
-                <a:sym typeface="Calibri"/>
-              </a:rPr>
-              <a:t>‹#›</a:t>
-            </a:fld>
-            <a:endParaRPr/>
-          </a:p>
-        </p:txBody>
-      </p:sp>
-    </p:spTree>
-  </p:cSld>
-  <p:clrMapOvr>
-    <a:masterClrMapping/>
-  </p:clrMapOvr>
-</p:notes>
-</file>
-
-<file path=ppt/notesSlides/notesSlide21.xml><?xml version="1.0" encoding="utf-8"?>
-<p:notes xmlns:a="http://schemas.openxmlformats.org/drawingml/2006/main" xmlns:r="http://schemas.openxmlformats.org/officeDocument/2006/relationships" xmlns:mc="http://schemas.openxmlformats.org/markup-compatibility/2006" xmlns:mv="urn:schemas-microsoft-com:mac:vml" xmlns:p="http://schemas.openxmlformats.org/presentationml/2006/main" xmlns:c="http://schemas.openxmlformats.org/drawingml/2006/chart" xmlns:dgm="http://schemas.openxmlformats.org/drawingml/2006/diagram" xmlns:o="urn:schemas-microsoft-com:office:office" xmlns:v="urn:schemas-microsoft-com:vml" xmlns:pvml="urn:schemas-microsoft-com:office:powerpoint" xmlns:com="http://schemas.openxmlformats.org/drawingml/2006/compatibility" xmlns:p14="http://schemas.microsoft.com/office/powerpoint/2010/main" xmlns:p15="http://schemas.microsoft.com/office/powerpoint/2012/main" xmlns:ahyp="http://schemas.microsoft.com/office/drawing/2018/hyperlinkcolor" showMasterPhAnim="0" showMasterSp="0">
-  <p:cSld>
-    <p:spTree>
-      <p:nvGrpSpPr>
-        <p:cNvPr id="265" name="Shape 265"/>
-        <p:cNvGrpSpPr/>
-        <p:nvPr/>
-      </p:nvGrpSpPr>
-      <p:grpSpPr>
-        <a:xfrm>
-          <a:off x="0" y="0"/>
-          <a:ext cx="0" cy="0"/>
-          <a:chOff x="0" y="0"/>
-          <a:chExt cx="0" cy="0"/>
-        </a:xfrm>
-      </p:grpSpPr>
-      <p:sp>
-        <p:nvSpPr>
-          <p:cNvPr id="266" name="Google Shape;266;p20:notes"/>
+          <p:cNvPr id="260" name="Google Shape;260;p20:notes"/>
           <p:cNvSpPr/>
           <p:nvPr>
             <p:ph idx="2" type="sldImg"/>
@@ -3939,7 +3757,7 @@
       </p:sp>
       <p:sp>
         <p:nvSpPr>
-          <p:cNvPr id="267" name="Google Shape;267;p20:notes"/>
+          <p:cNvPr id="261" name="Google Shape;261;p20:notes"/>
           <p:cNvSpPr txBox="1"/>
           <p:nvPr>
             <p:ph idx="1" type="body"/>
@@ -3990,7 +3808,7 @@
       </p:sp>
       <p:sp>
         <p:nvSpPr>
-          <p:cNvPr id="268" name="Google Shape;268;p20:notes"/>
+          <p:cNvPr id="262" name="Google Shape;262;p20:notes"/>
           <p:cNvSpPr txBox="1"/>
           <p:nvPr>
             <p:ph idx="12" type="sldNum"/>
@@ -13605,7 +13423,7 @@
             <a:tbl>
               <a:tblPr bandRow="1">
                 <a:noFill/>
-                <a:tableStyleId>{84F299B2-7866-4EFB-95E6-AAF9E077ECFF}</a:tableStyleId>
+                <a:tableStyleId>{2E805853-DA08-47E0-B8B1-5B519B90ADBB}</a:tableStyleId>
               </a:tblPr>
               <a:tblGrid>
                 <a:gridCol w="5920750"/>
@@ -14286,7 +14104,7 @@
             <a:tbl>
               <a:tblPr bandRow="1">
                 <a:noFill/>
-                <a:tableStyleId>{84F299B2-7866-4EFB-95E6-AAF9E077ECFF}</a:tableStyleId>
+                <a:tableStyleId>{2E805853-DA08-47E0-B8B1-5B519B90ADBB}</a:tableStyleId>
               </a:tblPr>
               <a:tblGrid>
                 <a:gridCol w="5604875"/>
@@ -15100,7 +14918,7 @@
         <p:spPr>
           <a:xfrm>
             <a:off x="3703603" y="2797835"/>
-            <a:ext cx="5618667" cy="830997"/>
+            <a:ext cx="5618700" cy="831000"/>
           </a:xfrm>
           <a:prstGeom prst="rect">
             <a:avLst/>
@@ -15294,2131 +15112,7 @@
       </p:grpSpPr>
       <p:graphicFrame>
         <p:nvGraphicFramePr>
-          <p:cNvPr id="207" name="Google Shape;207;p16"/>
-          <p:cNvGraphicFramePr/>
-          <p:nvPr/>
-        </p:nvGraphicFramePr>
-        <p:xfrm>
-          <a:off x="0" y="122190"/>
-          <a:ext cx="3000000" cy="3000000"/>
-        </p:xfrm>
-        <a:graphic>
-          <a:graphicData uri="http://schemas.openxmlformats.org/drawingml/2006/table">
-            <a:tbl>
-              <a:tblPr bandRow="1">
-                <a:noFill/>
-                <a:tableStyleId>{84F299B2-7866-4EFB-95E6-AAF9E077ECFF}</a:tableStyleId>
-              </a:tblPr>
-              <a:tblGrid>
-                <a:gridCol w="3048000"/>
-                <a:gridCol w="3048000"/>
-                <a:gridCol w="3048000"/>
-                <a:gridCol w="3048000"/>
-              </a:tblGrid>
-              <a:tr h="299125">
-                <a:tc gridSpan="4">
-                  <a:txBody>
-                    <a:bodyPr/>
-                    <a:lstStyle/>
-                    <a:p>
-                      <a:pPr indent="0" lvl="0" marL="0" marR="0" rtl="0" algn="ctr">
-                        <a:spcBef>
-                          <a:spcPts val="0"/>
-                        </a:spcBef>
-                        <a:spcAft>
-                          <a:spcPts val="0"/>
-                        </a:spcAft>
-                        <a:buClr>
-                          <a:schemeClr val="dk1"/>
-                        </a:buClr>
-                        <a:buSzPts val="2800"/>
-                        <a:buFont typeface="Calibri"/>
-                        <a:buNone/>
-                      </a:pPr>
-                      <a:r>
-                        <a:rPr b="1" lang="ar-AE" sz="2800" u="none" cap="none" strike="noStrike">
-                          <a:latin typeface="Calibri"/>
-                          <a:ea typeface="Calibri"/>
-                          <a:cs typeface="Calibri"/>
-                          <a:sym typeface="Calibri"/>
-                        </a:rPr>
-                        <a:t>Persona </a:t>
-                      </a:r>
-                      <a:r>
-                        <a:rPr b="1" lang="ar-AE" sz="2800">
-                          <a:latin typeface="Calibri"/>
-                          <a:ea typeface="Calibri"/>
-                          <a:cs typeface="Calibri"/>
-                          <a:sym typeface="Calibri"/>
-                        </a:rPr>
-                        <a:t>1</a:t>
-                      </a:r>
-                      <a:endParaRPr sz="2400" u="none" cap="none" strike="noStrike"/>
-                    </a:p>
-                  </a:txBody>
-                  <a:tcPr marT="45725" marB="45725" marR="68575" marL="68575">
-                    <a:lnL cap="flat" cmpd="sng" w="9525">
-                      <a:solidFill>
-                        <a:srgbClr val="999999"/>
-                      </a:solidFill>
-                      <a:prstDash val="solid"/>
-                      <a:round/>
-                      <a:headEnd len="sm" w="sm" type="none"/>
-                      <a:tailEnd len="sm" w="sm" type="none"/>
-                    </a:lnL>
-                    <a:lnR cap="flat" cmpd="sng" w="9525">
-                      <a:solidFill>
-                        <a:srgbClr val="999999"/>
-                      </a:solidFill>
-                      <a:prstDash val="solid"/>
-                      <a:round/>
-                      <a:headEnd len="sm" w="sm" type="none"/>
-                      <a:tailEnd len="sm" w="sm" type="none"/>
-                    </a:lnR>
-                    <a:lnT cap="flat" cmpd="sng" w="9525">
-                      <a:solidFill>
-                        <a:srgbClr val="999999"/>
-                      </a:solidFill>
-                      <a:prstDash val="solid"/>
-                      <a:round/>
-                      <a:headEnd len="sm" w="sm" type="none"/>
-                      <a:tailEnd len="sm" w="sm" type="none"/>
-                    </a:lnT>
-                    <a:lnB cap="flat" cmpd="sng" w="19025">
-                      <a:solidFill>
-                        <a:srgbClr val="666666"/>
-                      </a:solidFill>
-                      <a:prstDash val="solid"/>
-                      <a:round/>
-                      <a:headEnd len="sm" w="sm" type="none"/>
-                      <a:tailEnd len="sm" w="sm" type="none"/>
-                    </a:lnB>
-                  </a:tcPr>
-                </a:tc>
-                <a:tc hMerge="1"/>
-                <a:tc hMerge="1"/>
-                <a:tc hMerge="1"/>
-              </a:tr>
-              <a:tr h="736600">
-                <a:tc>
-                  <a:txBody>
-                    <a:bodyPr/>
-                    <a:lstStyle/>
-                    <a:p>
-                      <a:pPr indent="0" lvl="0" marL="0" marR="0" rtl="0" algn="l">
-                        <a:spcBef>
-                          <a:spcPts val="0"/>
-                        </a:spcBef>
-                        <a:spcAft>
-                          <a:spcPts val="0"/>
-                        </a:spcAft>
-                        <a:buClr>
-                          <a:schemeClr val="dk1"/>
-                        </a:buClr>
-                        <a:buSzPts val="1800"/>
-                        <a:buFont typeface="Arial"/>
-                        <a:buNone/>
-                      </a:pPr>
-                      <a:br>
-                        <a:rPr lang="ar-AE" sz="1800" u="none" cap="none" strike="noStrike"/>
-                      </a:br>
-                      <a:endParaRPr sz="2400" u="none" cap="none" strike="noStrike"/>
-                    </a:p>
-                    <a:p>
-                      <a:pPr indent="0" lvl="0" marL="0" marR="0" rtl="0" algn="ctr">
-                        <a:spcBef>
-                          <a:spcPts val="0"/>
-                        </a:spcBef>
-                        <a:spcAft>
-                          <a:spcPts val="0"/>
-                        </a:spcAft>
-                        <a:buClr>
-                          <a:srgbClr val="E8E8E8"/>
-                        </a:buClr>
-                        <a:buSzPts val="1800"/>
-                        <a:buFont typeface="Arial"/>
-                        <a:buNone/>
-                      </a:pPr>
-                      <a:r>
-                        <a:rPr b="1" lang="ar-AE" sz="1800" u="none" cap="none" strike="noStrike">
-                          <a:solidFill>
-                            <a:srgbClr val="E8E8E8"/>
-                          </a:solidFill>
-                          <a:latin typeface="Arial"/>
-                          <a:ea typeface="Arial"/>
-                          <a:cs typeface="Arial"/>
-                          <a:sym typeface="Arial"/>
-                        </a:rPr>
-                        <a:t>Background &amp; Demographics</a:t>
-                      </a:r>
-                      <a:endParaRPr sz="2400" u="none" cap="none" strike="noStrike"/>
-                    </a:p>
-                  </a:txBody>
-                  <a:tcPr marT="45725" marB="45725" marR="68575" marL="68575">
-                    <a:lnL cap="flat" cmpd="sng" w="9525">
-                      <a:solidFill>
-                        <a:srgbClr val="999999"/>
-                      </a:solidFill>
-                      <a:prstDash val="solid"/>
-                      <a:round/>
-                      <a:headEnd len="sm" w="sm" type="none"/>
-                      <a:tailEnd len="sm" w="sm" type="none"/>
-                    </a:lnL>
-                    <a:lnR cap="flat" cmpd="sng" w="9525">
-                      <a:solidFill>
-                        <a:srgbClr val="999999"/>
-                      </a:solidFill>
-                      <a:prstDash val="solid"/>
-                      <a:round/>
-                      <a:headEnd len="sm" w="sm" type="none"/>
-                      <a:tailEnd len="sm" w="sm" type="none"/>
-                    </a:lnR>
-                    <a:lnT cap="flat" cmpd="sng" w="19025">
-                      <a:solidFill>
-                        <a:srgbClr val="666666"/>
-                      </a:solidFill>
-                      <a:prstDash val="solid"/>
-                      <a:round/>
-                      <a:headEnd len="sm" w="sm" type="none"/>
-                      <a:tailEnd len="sm" w="sm" type="none"/>
-                    </a:lnT>
-                    <a:lnB cap="flat" cmpd="sng" w="9525">
-                      <a:solidFill>
-                        <a:srgbClr val="999999"/>
-                      </a:solidFill>
-                      <a:prstDash val="solid"/>
-                      <a:round/>
-                      <a:headEnd len="sm" w="sm" type="none"/>
-                      <a:tailEnd len="sm" w="sm" type="none"/>
-                    </a:lnB>
-                    <a:solidFill>
-                      <a:srgbClr val="3A3A3A"/>
-                    </a:solidFill>
-                  </a:tcPr>
-                </a:tc>
-                <a:tc>
-                  <a:txBody>
-                    <a:bodyPr/>
-                    <a:lstStyle/>
-                    <a:p>
-                      <a:pPr indent="0" lvl="0" marL="0" marR="0" rtl="0" algn="l">
-                        <a:spcBef>
-                          <a:spcPts val="0"/>
-                        </a:spcBef>
-                        <a:spcAft>
-                          <a:spcPts val="0"/>
-                        </a:spcAft>
-                        <a:buClr>
-                          <a:schemeClr val="dk1"/>
-                        </a:buClr>
-                        <a:buSzPts val="1800"/>
-                        <a:buFont typeface="Arial"/>
-                        <a:buNone/>
-                      </a:pPr>
-                      <a:br>
-                        <a:rPr lang="ar-AE" sz="1800" u="none" cap="none" strike="noStrike"/>
-                      </a:br>
-                      <a:endParaRPr sz="2400" u="none" cap="none" strike="noStrike"/>
-                    </a:p>
-                    <a:p>
-                      <a:pPr indent="0" lvl="0" marL="0" marR="0" rtl="0" algn="ctr">
-                        <a:spcBef>
-                          <a:spcPts val="0"/>
-                        </a:spcBef>
-                        <a:spcAft>
-                          <a:spcPts val="0"/>
-                        </a:spcAft>
-                        <a:buClr>
-                          <a:srgbClr val="E8E8E8"/>
-                        </a:buClr>
-                        <a:buSzPts val="1800"/>
-                        <a:buFont typeface="Arial"/>
-                        <a:buNone/>
-                      </a:pPr>
-                      <a:r>
-                        <a:rPr b="1" lang="ar-AE" sz="1800" u="none" cap="none" strike="noStrike">
-                          <a:solidFill>
-                            <a:srgbClr val="E8E8E8"/>
-                          </a:solidFill>
-                          <a:latin typeface="Arial"/>
-                          <a:ea typeface="Arial"/>
-                          <a:cs typeface="Arial"/>
-                          <a:sym typeface="Arial"/>
-                        </a:rPr>
-                        <a:t>Target Person name</a:t>
-                      </a:r>
-                      <a:endParaRPr sz="2400" u="none" cap="none" strike="noStrike"/>
-                    </a:p>
-                  </a:txBody>
-                  <a:tcPr marT="45725" marB="45725" marR="68575" marL="68575">
-                    <a:lnL cap="flat" cmpd="sng" w="9525">
-                      <a:solidFill>
-                        <a:srgbClr val="999999"/>
-                      </a:solidFill>
-                      <a:prstDash val="solid"/>
-                      <a:round/>
-                      <a:headEnd len="sm" w="sm" type="none"/>
-                      <a:tailEnd len="sm" w="sm" type="none"/>
-                    </a:lnL>
-                    <a:lnR cap="flat" cmpd="sng" w="9525">
-                      <a:solidFill>
-                        <a:srgbClr val="999999"/>
-                      </a:solidFill>
-                      <a:prstDash val="solid"/>
-                      <a:round/>
-                      <a:headEnd len="sm" w="sm" type="none"/>
-                      <a:tailEnd len="sm" w="sm" type="none"/>
-                    </a:lnR>
-                    <a:lnT cap="flat" cmpd="sng" w="19025">
-                      <a:solidFill>
-                        <a:srgbClr val="666666"/>
-                      </a:solidFill>
-                      <a:prstDash val="solid"/>
-                      <a:round/>
-                      <a:headEnd len="sm" w="sm" type="none"/>
-                      <a:tailEnd len="sm" w="sm" type="none"/>
-                    </a:lnT>
-                    <a:lnB cap="flat" cmpd="sng" w="9525">
-                      <a:solidFill>
-                        <a:srgbClr val="999999"/>
-                      </a:solidFill>
-                      <a:prstDash val="solid"/>
-                      <a:round/>
-                      <a:headEnd len="sm" w="sm" type="none"/>
-                      <a:tailEnd len="sm" w="sm" type="none"/>
-                    </a:lnB>
-                    <a:solidFill>
-                      <a:srgbClr val="3A3A3A"/>
-                    </a:solidFill>
-                  </a:tcPr>
-                </a:tc>
-                <a:tc>
-                  <a:txBody>
-                    <a:bodyPr/>
-                    <a:lstStyle/>
-                    <a:p>
-                      <a:pPr indent="0" lvl="0" marL="0" marR="0" rtl="0" algn="l">
-                        <a:spcBef>
-                          <a:spcPts val="0"/>
-                        </a:spcBef>
-                        <a:spcAft>
-                          <a:spcPts val="0"/>
-                        </a:spcAft>
-                        <a:buClr>
-                          <a:schemeClr val="dk1"/>
-                        </a:buClr>
-                        <a:buSzPts val="1800"/>
-                        <a:buFont typeface="Arial"/>
-                        <a:buNone/>
-                      </a:pPr>
-                      <a:br>
-                        <a:rPr lang="ar-AE" sz="1800" u="none" cap="none" strike="noStrike"/>
-                      </a:br>
-                      <a:endParaRPr sz="2400" u="none" cap="none" strike="noStrike"/>
-                    </a:p>
-                    <a:p>
-                      <a:pPr indent="0" lvl="0" marL="0" marR="0" rtl="0" algn="ctr">
-                        <a:spcBef>
-                          <a:spcPts val="0"/>
-                        </a:spcBef>
-                        <a:spcAft>
-                          <a:spcPts val="0"/>
-                        </a:spcAft>
-                        <a:buClr>
-                          <a:srgbClr val="E8E8E8"/>
-                        </a:buClr>
-                        <a:buSzPts val="1800"/>
-                        <a:buFont typeface="Arial"/>
-                        <a:buNone/>
-                      </a:pPr>
-                      <a:r>
-                        <a:rPr b="1" lang="ar-AE" sz="1800" u="none" cap="none" strike="noStrike">
-                          <a:solidFill>
-                            <a:srgbClr val="E8E8E8"/>
-                          </a:solidFill>
-                          <a:latin typeface="Arial"/>
-                          <a:ea typeface="Arial"/>
-                          <a:cs typeface="Arial"/>
-                          <a:sym typeface="Arial"/>
-                        </a:rPr>
-                        <a:t>Needs</a:t>
-                      </a:r>
-                      <a:endParaRPr sz="2400" u="none" cap="none" strike="noStrike"/>
-                    </a:p>
-                  </a:txBody>
-                  <a:tcPr marT="45725" marB="45725" marR="68575" marL="68575">
-                    <a:lnL cap="flat" cmpd="sng" w="9525">
-                      <a:solidFill>
-                        <a:srgbClr val="999999"/>
-                      </a:solidFill>
-                      <a:prstDash val="solid"/>
-                      <a:round/>
-                      <a:headEnd len="sm" w="sm" type="none"/>
-                      <a:tailEnd len="sm" w="sm" type="none"/>
-                    </a:lnL>
-                    <a:lnR cap="flat" cmpd="sng" w="9525">
-                      <a:solidFill>
-                        <a:srgbClr val="999999"/>
-                      </a:solidFill>
-                      <a:prstDash val="solid"/>
-                      <a:round/>
-                      <a:headEnd len="sm" w="sm" type="none"/>
-                      <a:tailEnd len="sm" w="sm" type="none"/>
-                    </a:lnR>
-                    <a:lnT cap="flat" cmpd="sng" w="19025">
-                      <a:solidFill>
-                        <a:srgbClr val="666666"/>
-                      </a:solidFill>
-                      <a:prstDash val="solid"/>
-                      <a:round/>
-                      <a:headEnd len="sm" w="sm" type="none"/>
-                      <a:tailEnd len="sm" w="sm" type="none"/>
-                    </a:lnT>
-                    <a:lnB cap="flat" cmpd="sng" w="9525">
-                      <a:solidFill>
-                        <a:srgbClr val="999999"/>
-                      </a:solidFill>
-                      <a:prstDash val="solid"/>
-                      <a:round/>
-                      <a:headEnd len="sm" w="sm" type="none"/>
-                      <a:tailEnd len="sm" w="sm" type="none"/>
-                    </a:lnB>
-                    <a:solidFill>
-                      <a:srgbClr val="3A3A3A"/>
-                    </a:solidFill>
-                  </a:tcPr>
-                </a:tc>
-                <a:tc>
-                  <a:txBody>
-                    <a:bodyPr/>
-                    <a:lstStyle/>
-                    <a:p>
-                      <a:pPr indent="0" lvl="0" marL="0" marR="0" rtl="0" algn="l">
-                        <a:spcBef>
-                          <a:spcPts val="0"/>
-                        </a:spcBef>
-                        <a:spcAft>
-                          <a:spcPts val="0"/>
-                        </a:spcAft>
-                        <a:buClr>
-                          <a:schemeClr val="dk1"/>
-                        </a:buClr>
-                        <a:buSzPts val="1800"/>
-                        <a:buFont typeface="Arial"/>
-                        <a:buNone/>
-                      </a:pPr>
-                      <a:br>
-                        <a:rPr lang="ar-AE" sz="1800" u="none" cap="none" strike="noStrike"/>
-                      </a:br>
-                      <a:endParaRPr sz="2400" u="none" cap="none" strike="noStrike"/>
-                    </a:p>
-                    <a:p>
-                      <a:pPr indent="0" lvl="0" marL="0" marR="0" rtl="0" algn="ctr">
-                        <a:spcBef>
-                          <a:spcPts val="0"/>
-                        </a:spcBef>
-                        <a:spcAft>
-                          <a:spcPts val="0"/>
-                        </a:spcAft>
-                        <a:buClr>
-                          <a:srgbClr val="E8E8E8"/>
-                        </a:buClr>
-                        <a:buSzPts val="1800"/>
-                        <a:buFont typeface="Arial"/>
-                        <a:buNone/>
-                      </a:pPr>
-                      <a:r>
-                        <a:rPr b="1" lang="ar-AE" sz="1800" u="none" cap="none" strike="noStrike">
-                          <a:solidFill>
-                            <a:srgbClr val="E8E8E8"/>
-                          </a:solidFill>
-                          <a:latin typeface="Arial"/>
-                          <a:ea typeface="Arial"/>
-                          <a:cs typeface="Arial"/>
-                          <a:sym typeface="Arial"/>
-                        </a:rPr>
-                        <a:t>Objections</a:t>
-                      </a:r>
-                      <a:endParaRPr sz="2400" u="none" cap="none" strike="noStrike"/>
-                    </a:p>
-                  </a:txBody>
-                  <a:tcPr marT="45725" marB="45725" marR="68575" marL="68575">
-                    <a:lnL cap="flat" cmpd="sng" w="9525">
-                      <a:solidFill>
-                        <a:srgbClr val="999999"/>
-                      </a:solidFill>
-                      <a:prstDash val="solid"/>
-                      <a:round/>
-                      <a:headEnd len="sm" w="sm" type="none"/>
-                      <a:tailEnd len="sm" w="sm" type="none"/>
-                    </a:lnL>
-                    <a:lnR cap="flat" cmpd="sng" w="9525">
-                      <a:solidFill>
-                        <a:srgbClr val="999999"/>
-                      </a:solidFill>
-                      <a:prstDash val="solid"/>
-                      <a:round/>
-                      <a:headEnd len="sm" w="sm" type="none"/>
-                      <a:tailEnd len="sm" w="sm" type="none"/>
-                    </a:lnR>
-                    <a:lnT cap="flat" cmpd="sng" w="19025">
-                      <a:solidFill>
-                        <a:srgbClr val="666666"/>
-                      </a:solidFill>
-                      <a:prstDash val="solid"/>
-                      <a:round/>
-                      <a:headEnd len="sm" w="sm" type="none"/>
-                      <a:tailEnd len="sm" w="sm" type="none"/>
-                    </a:lnT>
-                    <a:lnB cap="flat" cmpd="sng" w="9525">
-                      <a:solidFill>
-                        <a:srgbClr val="999999"/>
-                      </a:solidFill>
-                      <a:prstDash val="solid"/>
-                      <a:round/>
-                      <a:headEnd len="sm" w="sm" type="none"/>
-                      <a:tailEnd len="sm" w="sm" type="none"/>
-                    </a:lnB>
-                    <a:solidFill>
-                      <a:srgbClr val="3A3A3A"/>
-                    </a:solidFill>
-                  </a:tcPr>
-                </a:tc>
-              </a:tr>
-              <a:tr h="736600">
-                <a:tc>
-                  <a:txBody>
-                    <a:bodyPr/>
-                    <a:lstStyle/>
-                    <a:p>
-                      <a:pPr indent="0" lvl="0" marL="0" marR="0" rtl="0" algn="l">
-                        <a:spcBef>
-                          <a:spcPts val="0"/>
-                        </a:spcBef>
-                        <a:spcAft>
-                          <a:spcPts val="0"/>
-                        </a:spcAft>
-                        <a:buClr>
-                          <a:schemeClr val="dk1"/>
-                        </a:buClr>
-                        <a:buSzPts val="1800"/>
-                        <a:buFont typeface="Arial"/>
-                        <a:buNone/>
-                      </a:pPr>
-                      <a:br>
-                        <a:rPr lang="ar-AE" sz="1800" u="none" cap="none" strike="noStrike"/>
-                      </a:br>
-                      <a:endParaRPr sz="2400" u="none" cap="none" strike="noStrike"/>
-                    </a:p>
-                    <a:p>
-                      <a:pPr indent="0" lvl="0" marL="228600" marR="0" rtl="0" algn="ctr">
-                        <a:spcBef>
-                          <a:spcPts val="0"/>
-                        </a:spcBef>
-                        <a:spcAft>
-                          <a:spcPts val="0"/>
-                        </a:spcAft>
-                        <a:buClr>
-                          <a:schemeClr val="dk1"/>
-                        </a:buClr>
-                        <a:buSzPts val="1800"/>
-                        <a:buFont typeface="Arial"/>
-                        <a:buNone/>
-                      </a:pPr>
-                      <a:r>
-                        <a:rPr b="1" lang="ar-AE" sz="1800" u="none" cap="none" strike="noStrike">
-                          <a:latin typeface="Arial"/>
-                          <a:ea typeface="Arial"/>
-                          <a:cs typeface="Arial"/>
-                          <a:sym typeface="Arial"/>
-                        </a:rPr>
-                        <a:t>ذكر</a:t>
-                      </a:r>
-                      <a:endParaRPr sz="2400" u="none" cap="none" strike="noStrike"/>
-                    </a:p>
-                    <a:p>
-                      <a:pPr indent="0" lvl="0" marL="228600" marR="0" rtl="0" algn="ctr">
-                        <a:spcBef>
-                          <a:spcPts val="0"/>
-                        </a:spcBef>
-                        <a:spcAft>
-                          <a:spcPts val="0"/>
-                        </a:spcAft>
-                        <a:buClr>
-                          <a:schemeClr val="dk1"/>
-                        </a:buClr>
-                        <a:buSzPts val="1800"/>
-                        <a:buFont typeface="Arial"/>
-                        <a:buNone/>
-                      </a:pPr>
-                      <a:r>
-                        <a:rPr b="1" lang="ar-AE" sz="1800" u="none" cap="none" strike="noStrike">
-                          <a:latin typeface="Arial"/>
-                          <a:ea typeface="Arial"/>
-                          <a:cs typeface="Arial"/>
-                          <a:sym typeface="Arial"/>
-                        </a:rPr>
-                        <a:t>6-12</a:t>
-                      </a:r>
-                      <a:endParaRPr sz="2400" u="none" cap="none" strike="noStrike"/>
-                    </a:p>
-                    <a:p>
-                      <a:pPr indent="0" lvl="0" marL="228600" marR="0" rtl="0" algn="ctr">
-                        <a:spcBef>
-                          <a:spcPts val="0"/>
-                        </a:spcBef>
-                        <a:spcAft>
-                          <a:spcPts val="0"/>
-                        </a:spcAft>
-                        <a:buClr>
-                          <a:schemeClr val="dk1"/>
-                        </a:buClr>
-                        <a:buSzPts val="1800"/>
-                        <a:buFont typeface="Arial"/>
-                        <a:buNone/>
-                      </a:pPr>
-                      <a:r>
-                        <a:rPr b="1" lang="ar-AE" sz="1800" u="none" cap="none" strike="noStrike">
-                          <a:latin typeface="Arial"/>
-                          <a:ea typeface="Arial"/>
-                          <a:cs typeface="Arial"/>
-                          <a:sym typeface="Arial"/>
-                        </a:rPr>
-                        <a:t>مرحلة الابتدائي</a:t>
-                      </a:r>
-                      <a:endParaRPr sz="2400" u="none" cap="none" strike="noStrike"/>
-                    </a:p>
-                  </a:txBody>
-                  <a:tcPr marT="45725" marB="45725" marR="68575" marL="68575">
-                    <a:lnL cap="flat" cmpd="sng" w="9525">
-                      <a:solidFill>
-                        <a:srgbClr val="999999"/>
-                      </a:solidFill>
-                      <a:prstDash val="solid"/>
-                      <a:round/>
-                      <a:headEnd len="sm" w="sm" type="none"/>
-                      <a:tailEnd len="sm" w="sm" type="none"/>
-                    </a:lnL>
-                    <a:lnR cap="flat" cmpd="sng" w="9525">
-                      <a:solidFill>
-                        <a:srgbClr val="999999"/>
-                      </a:solidFill>
-                      <a:prstDash val="solid"/>
-                      <a:round/>
-                      <a:headEnd len="sm" w="sm" type="none"/>
-                      <a:tailEnd len="sm" w="sm" type="none"/>
-                    </a:lnR>
-                    <a:lnT cap="flat" cmpd="sng" w="9525">
-                      <a:solidFill>
-                        <a:srgbClr val="999999"/>
-                      </a:solidFill>
-                      <a:prstDash val="solid"/>
-                      <a:round/>
-                      <a:headEnd len="sm" w="sm" type="none"/>
-                      <a:tailEnd len="sm" w="sm" type="none"/>
-                    </a:lnT>
-                    <a:lnB cap="flat" cmpd="sng" w="9525">
-                      <a:solidFill>
-                        <a:srgbClr val="999999"/>
-                      </a:solidFill>
-                      <a:prstDash val="solid"/>
-                      <a:round/>
-                      <a:headEnd len="sm" w="sm" type="none"/>
-                      <a:tailEnd len="sm" w="sm" type="none"/>
-                    </a:lnB>
-                  </a:tcPr>
-                </a:tc>
-                <a:tc>
-                  <a:txBody>
-                    <a:bodyPr/>
-                    <a:lstStyle/>
-                    <a:p>
-                      <a:pPr indent="0" lvl="0" marL="0" marR="0" rtl="0" algn="l">
-                        <a:spcBef>
-                          <a:spcPts val="0"/>
-                        </a:spcBef>
-                        <a:spcAft>
-                          <a:spcPts val="0"/>
-                        </a:spcAft>
-                        <a:buClr>
-                          <a:schemeClr val="dk1"/>
-                        </a:buClr>
-                        <a:buSzPts val="1800"/>
-                        <a:buFont typeface="Arial"/>
-                        <a:buNone/>
-                      </a:pPr>
-                      <a:br>
-                        <a:rPr lang="ar-AE" sz="1800" u="none" cap="none" strike="noStrike"/>
-                      </a:br>
-                      <a:endParaRPr sz="2400" u="none" cap="none" strike="noStrike"/>
-                    </a:p>
-                    <a:p>
-                      <a:pPr indent="0" lvl="0" marL="0" marR="0" rtl="0" algn="ctr">
-                        <a:spcBef>
-                          <a:spcPts val="0"/>
-                        </a:spcBef>
-                        <a:spcAft>
-                          <a:spcPts val="0"/>
-                        </a:spcAft>
-                        <a:buClr>
-                          <a:schemeClr val="dk1"/>
-                        </a:buClr>
-                        <a:buSzPts val="1800"/>
-                        <a:buFont typeface="Arial"/>
-                        <a:buNone/>
-                      </a:pPr>
-                      <a:r>
-                        <a:rPr b="1" lang="ar-AE" sz="1800" u="none" cap="none" strike="noStrike">
-                          <a:latin typeface="Arial"/>
-                          <a:ea typeface="Arial"/>
-                          <a:cs typeface="Arial"/>
-                          <a:sym typeface="Arial"/>
-                        </a:rPr>
-                        <a:t>سامي اكرم</a:t>
-                      </a:r>
-                      <a:endParaRPr sz="2400" u="none" cap="none" strike="noStrike"/>
-                    </a:p>
-                    <a:p>
-                      <a:pPr indent="0" lvl="0" marL="0" marR="0" rtl="0" algn="l">
-                        <a:spcBef>
-                          <a:spcPts val="0"/>
-                        </a:spcBef>
-                        <a:spcAft>
-                          <a:spcPts val="0"/>
-                        </a:spcAft>
-                        <a:buClr>
-                          <a:schemeClr val="dk1"/>
-                        </a:buClr>
-                        <a:buSzPts val="1800"/>
-                        <a:buFont typeface="Arial"/>
-                        <a:buNone/>
-                      </a:pPr>
-                      <a:br>
-                        <a:rPr lang="ar-AE" sz="1800" u="none" cap="none" strike="noStrike"/>
-                      </a:br>
-                      <a:br>
-                        <a:rPr lang="ar-AE" sz="1800" u="none" cap="none" strike="noStrike"/>
-                      </a:br>
-                      <a:endParaRPr sz="2400" u="none" cap="none" strike="noStrike"/>
-                    </a:p>
-                  </a:txBody>
-                  <a:tcPr marT="45725" marB="45725" marR="68575" marL="68575">
-                    <a:lnL cap="flat" cmpd="sng" w="9525">
-                      <a:solidFill>
-                        <a:srgbClr val="999999"/>
-                      </a:solidFill>
-                      <a:prstDash val="solid"/>
-                      <a:round/>
-                      <a:headEnd len="sm" w="sm" type="none"/>
-                      <a:tailEnd len="sm" w="sm" type="none"/>
-                    </a:lnL>
-                    <a:lnR cap="flat" cmpd="sng" w="9525">
-                      <a:solidFill>
-                        <a:srgbClr val="999999"/>
-                      </a:solidFill>
-                      <a:prstDash val="solid"/>
-                      <a:round/>
-                      <a:headEnd len="sm" w="sm" type="none"/>
-                      <a:tailEnd len="sm" w="sm" type="none"/>
-                    </a:lnR>
-                    <a:lnT cap="flat" cmpd="sng" w="9525">
-                      <a:solidFill>
-                        <a:srgbClr val="999999"/>
-                      </a:solidFill>
-                      <a:prstDash val="solid"/>
-                      <a:round/>
-                      <a:headEnd len="sm" w="sm" type="none"/>
-                      <a:tailEnd len="sm" w="sm" type="none"/>
-                    </a:lnT>
-                    <a:lnB cap="flat" cmpd="sng" w="9525">
-                      <a:solidFill>
-                        <a:srgbClr val="999999"/>
-                      </a:solidFill>
-                      <a:prstDash val="solid"/>
-                      <a:round/>
-                      <a:headEnd len="sm" w="sm" type="none"/>
-                      <a:tailEnd len="sm" w="sm" type="none"/>
-                    </a:lnB>
-                  </a:tcPr>
-                </a:tc>
-                <a:tc>
-                  <a:txBody>
-                    <a:bodyPr/>
-                    <a:lstStyle/>
-                    <a:p>
-                      <a:pPr indent="0" lvl="0" marL="0" marR="0" rtl="0" algn="l">
-                        <a:spcBef>
-                          <a:spcPts val="0"/>
-                        </a:spcBef>
-                        <a:spcAft>
-                          <a:spcPts val="0"/>
-                        </a:spcAft>
-                        <a:buClr>
-                          <a:schemeClr val="dk1"/>
-                        </a:buClr>
-                        <a:buSzPts val="1800"/>
-                        <a:buFont typeface="Arial"/>
-                        <a:buNone/>
-                      </a:pPr>
-                      <a:r>
-                        <a:rPr lang="ar-AE" sz="1800" u="none" cap="none" strike="noStrike">
-                          <a:latin typeface="Arial"/>
-                          <a:ea typeface="Arial"/>
-                          <a:cs typeface="Arial"/>
-                          <a:sym typeface="Arial"/>
-                        </a:rPr>
-                        <a:t>    </a:t>
-                      </a:r>
-                      <a:r>
-                        <a:rPr lang="ar-AE" sz="1800" u="none" cap="none" strike="noStrike">
-                          <a:latin typeface="Arial"/>
-                          <a:ea typeface="Arial"/>
-                          <a:cs typeface="Arial"/>
-                          <a:sym typeface="Arial"/>
-                        </a:rPr>
-                        <a:t> </a:t>
-                      </a:r>
-                      <a:r>
-                        <a:rPr lang="ar-AE" sz="1800" u="none" cap="none" strike="noStrike">
-                          <a:latin typeface="Arial"/>
-                          <a:ea typeface="Arial"/>
-                          <a:cs typeface="Arial"/>
-                          <a:sym typeface="Arial"/>
-                        </a:rPr>
-                        <a:t>محتوي ترفيهي بديل عن الموبا</a:t>
-                      </a:r>
-                      <a:r>
-                        <a:rPr lang="ar-AE" sz="1800">
-                          <a:latin typeface="Arial"/>
-                          <a:ea typeface="Arial"/>
-                          <a:cs typeface="Arial"/>
-                          <a:sym typeface="Arial"/>
-                        </a:rPr>
-                        <a:t>يل</a:t>
-                      </a:r>
-                      <a:endParaRPr sz="2400" u="none" cap="none" strike="noStrike">
-                        <a:latin typeface="Arial"/>
-                        <a:ea typeface="Arial"/>
-                        <a:cs typeface="Arial"/>
-                        <a:sym typeface="Arial"/>
-                      </a:endParaRPr>
-                    </a:p>
-                    <a:p>
-                      <a:pPr indent="0" lvl="0" marL="0" marR="0" rtl="0" algn="ctr">
-                        <a:spcBef>
-                          <a:spcPts val="0"/>
-                        </a:spcBef>
-                        <a:spcAft>
-                          <a:spcPts val="0"/>
-                        </a:spcAft>
-                        <a:buClr>
-                          <a:schemeClr val="dk1"/>
-                        </a:buClr>
-                        <a:buSzPts val="1800"/>
-                        <a:buFont typeface="Arial"/>
-                        <a:buNone/>
-                      </a:pPr>
-                      <a:r>
-                        <a:rPr lang="ar-AE" sz="1800" u="none" cap="none" strike="noStrike">
-                          <a:latin typeface="Arial"/>
-                          <a:ea typeface="Arial"/>
-                          <a:cs typeface="Arial"/>
-                          <a:sym typeface="Arial"/>
-                        </a:rPr>
-                        <a:t> انشطة جماعية مع الاهل </a:t>
-                      </a:r>
-                      <a:endParaRPr sz="2400" u="none" cap="none" strike="noStrike"/>
-                    </a:p>
-                    <a:p>
-                      <a:pPr indent="0" lvl="0" marL="0" marR="0" rtl="0" algn="ctr">
-                        <a:spcBef>
-                          <a:spcPts val="0"/>
-                        </a:spcBef>
-                        <a:spcAft>
-                          <a:spcPts val="0"/>
-                        </a:spcAft>
-                        <a:buClr>
-                          <a:schemeClr val="dk1"/>
-                        </a:buClr>
-                        <a:buSzPts val="1800"/>
-                        <a:buFont typeface="Arial"/>
-                        <a:buNone/>
-                      </a:pPr>
-                      <a:r>
-                        <a:rPr lang="ar-AE" sz="1800" u="none" cap="none" strike="noStrike">
-                          <a:latin typeface="Arial"/>
-                          <a:ea typeface="Arial"/>
-                          <a:cs typeface="Arial"/>
-                          <a:sym typeface="Arial"/>
-                        </a:rPr>
-                        <a:t> قواعد لاستخدام الموبايلات بوقت محدد</a:t>
-                      </a:r>
-                      <a:endParaRPr sz="2400" u="none" cap="none" strike="noStrike"/>
-                    </a:p>
-                  </a:txBody>
-                  <a:tcPr marT="45725" marB="45725" marR="68575" marL="68575" anchor="ctr">
-                    <a:lnL cap="flat" cmpd="sng" w="9525">
-                      <a:solidFill>
-                        <a:srgbClr val="999999"/>
-                      </a:solidFill>
-                      <a:prstDash val="solid"/>
-                      <a:round/>
-                      <a:headEnd len="sm" w="sm" type="none"/>
-                      <a:tailEnd len="sm" w="sm" type="none"/>
-                    </a:lnL>
-                    <a:lnR cap="flat" cmpd="sng" w="9525">
-                      <a:solidFill>
-                        <a:srgbClr val="999999"/>
-                      </a:solidFill>
-                      <a:prstDash val="solid"/>
-                      <a:round/>
-                      <a:headEnd len="sm" w="sm" type="none"/>
-                      <a:tailEnd len="sm" w="sm" type="none"/>
-                    </a:lnR>
-                    <a:lnT cap="flat" cmpd="sng" w="9525">
-                      <a:solidFill>
-                        <a:srgbClr val="999999"/>
-                      </a:solidFill>
-                      <a:prstDash val="solid"/>
-                      <a:round/>
-                      <a:headEnd len="sm" w="sm" type="none"/>
-                      <a:tailEnd len="sm" w="sm" type="none"/>
-                    </a:lnT>
-                    <a:lnB cap="flat" cmpd="sng" w="9525">
-                      <a:solidFill>
-                        <a:srgbClr val="999999"/>
-                      </a:solidFill>
-                      <a:prstDash val="solid"/>
-                      <a:round/>
-                      <a:headEnd len="sm" w="sm" type="none"/>
-                      <a:tailEnd len="sm" w="sm" type="none"/>
-                    </a:lnB>
-                  </a:tcPr>
-                </a:tc>
-                <a:tc>
-                  <a:txBody>
-                    <a:bodyPr/>
-                    <a:lstStyle/>
-                    <a:p>
-                      <a:pPr indent="0" lvl="0" marL="0" marR="0" rtl="1" algn="r">
-                        <a:spcBef>
-                          <a:spcPts val="0"/>
-                        </a:spcBef>
-                        <a:spcAft>
-                          <a:spcPts val="0"/>
-                        </a:spcAft>
-                        <a:buClr>
-                          <a:schemeClr val="dk1"/>
-                        </a:buClr>
-                        <a:buSzPts val="1800"/>
-                        <a:buFont typeface="Arial"/>
-                        <a:buNone/>
-                      </a:pPr>
-                      <a:r>
-                        <a:rPr lang="ar-AE" sz="1800">
-                          <a:latin typeface="Arial"/>
-                          <a:ea typeface="Arial"/>
-                          <a:cs typeface="Arial"/>
-                          <a:sym typeface="Arial"/>
-                        </a:rPr>
-                        <a:t>  </a:t>
-                      </a:r>
-                      <a:endParaRPr sz="1800">
-                        <a:latin typeface="Arial"/>
-                        <a:ea typeface="Arial"/>
-                        <a:cs typeface="Arial"/>
-                        <a:sym typeface="Arial"/>
-                      </a:endParaRPr>
-                    </a:p>
-                    <a:p>
-                      <a:pPr indent="0" lvl="0" marL="0" marR="0" rtl="1" algn="r">
-                        <a:spcBef>
-                          <a:spcPts val="0"/>
-                        </a:spcBef>
-                        <a:spcAft>
-                          <a:spcPts val="0"/>
-                        </a:spcAft>
-                        <a:buClr>
-                          <a:schemeClr val="dk1"/>
-                        </a:buClr>
-                        <a:buSzPts val="1800"/>
-                        <a:buFont typeface="Arial"/>
-                        <a:buNone/>
-                      </a:pPr>
-                      <a:r>
-                        <a:t/>
-                      </a:r>
-                      <a:endParaRPr sz="1800">
-                        <a:latin typeface="Arial"/>
-                        <a:ea typeface="Arial"/>
-                        <a:cs typeface="Arial"/>
-                        <a:sym typeface="Arial"/>
-                      </a:endParaRPr>
-                    </a:p>
-                    <a:p>
-                      <a:pPr indent="0" lvl="0" marL="0" marR="0" rtl="1" algn="r">
-                        <a:spcBef>
-                          <a:spcPts val="0"/>
-                        </a:spcBef>
-                        <a:spcAft>
-                          <a:spcPts val="0"/>
-                        </a:spcAft>
-                        <a:buClr>
-                          <a:schemeClr val="dk1"/>
-                        </a:buClr>
-                        <a:buSzPts val="1800"/>
-                        <a:buFont typeface="Arial"/>
-                        <a:buNone/>
-                      </a:pPr>
-                      <a:r>
-                        <a:rPr lang="ar-AE" sz="1800">
-                          <a:latin typeface="Arial"/>
-                          <a:ea typeface="Arial"/>
-                          <a:cs typeface="Arial"/>
-                          <a:sym typeface="Arial"/>
-                        </a:rPr>
-                        <a:t>     </a:t>
-                      </a:r>
-                      <a:r>
-                        <a:rPr lang="ar-AE" sz="1800" u="none" cap="none" strike="noStrike">
-                          <a:latin typeface="Arial"/>
-                          <a:ea typeface="Arial"/>
-                          <a:cs typeface="Arial"/>
-                          <a:sym typeface="Arial"/>
-                        </a:rPr>
-                        <a:t>انا زهقان من غير الموبايل </a:t>
-                      </a:r>
-                      <a:endParaRPr sz="1800">
-                        <a:latin typeface="Arial"/>
-                        <a:ea typeface="Arial"/>
-                        <a:cs typeface="Arial"/>
-                        <a:sym typeface="Arial"/>
-                      </a:endParaRPr>
-                    </a:p>
-                    <a:p>
-                      <a:pPr indent="0" lvl="0" marL="0" marR="0" rtl="0" algn="ctr">
-                        <a:spcBef>
-                          <a:spcPts val="0"/>
-                        </a:spcBef>
-                        <a:spcAft>
-                          <a:spcPts val="0"/>
-                        </a:spcAft>
-                        <a:buClr>
-                          <a:schemeClr val="dk1"/>
-                        </a:buClr>
-                        <a:buSzPts val="1800"/>
-                        <a:buFont typeface="Arial"/>
-                        <a:buNone/>
-                      </a:pPr>
-                      <a:r>
-                        <a:rPr lang="ar-AE" sz="1800" u="none" cap="none" strike="noStrike">
-                          <a:latin typeface="Arial"/>
-                          <a:ea typeface="Arial"/>
-                          <a:cs typeface="Arial"/>
-                          <a:sym typeface="Arial"/>
-                        </a:rPr>
-                        <a:t>- كل صحابي عندهم العاب وموبايلات</a:t>
-                      </a:r>
-                      <a:endParaRPr sz="2400" u="none" cap="none" strike="noStrike"/>
-                    </a:p>
-                    <a:p>
-                      <a:pPr indent="0" lvl="0" marL="324483" marR="0" rtl="0" algn="ctr">
-                        <a:spcBef>
-                          <a:spcPts val="0"/>
-                        </a:spcBef>
-                        <a:spcAft>
-                          <a:spcPts val="0"/>
-                        </a:spcAft>
-                        <a:buClr>
-                          <a:schemeClr val="dk1"/>
-                        </a:buClr>
-                        <a:buSzPts val="1800"/>
-                        <a:buFont typeface="Arial"/>
-                        <a:buNone/>
-                      </a:pPr>
-                      <a:r>
-                        <a:rPr lang="ar-AE" sz="1800" u="none" cap="none" strike="noStrike">
-                          <a:latin typeface="Arial"/>
-                          <a:ea typeface="Arial"/>
-                          <a:cs typeface="Arial"/>
-                          <a:sym typeface="Arial"/>
-                        </a:rPr>
-                        <a:t> اخلص اللعبه دي  واسيبه</a:t>
-                      </a:r>
-                      <a:endParaRPr sz="2400" u="none" cap="none" strike="noStrike"/>
-                    </a:p>
-                    <a:p>
-                      <a:pPr indent="0" lvl="0" marL="0" marR="0" rtl="0" algn="l">
-                        <a:spcBef>
-                          <a:spcPts val="0"/>
-                        </a:spcBef>
-                        <a:spcAft>
-                          <a:spcPts val="0"/>
-                        </a:spcAft>
-                        <a:buClr>
-                          <a:schemeClr val="dk1"/>
-                        </a:buClr>
-                        <a:buSzPts val="1800"/>
-                        <a:buFont typeface="Arial"/>
-                        <a:buNone/>
-                      </a:pPr>
-                      <a:br>
-                        <a:rPr lang="ar-AE" sz="1800" u="none" cap="none" strike="noStrike"/>
-                      </a:br>
-                      <a:endParaRPr sz="2400" u="none" cap="none" strike="noStrike"/>
-                    </a:p>
-                  </a:txBody>
-                  <a:tcPr marT="45725" marB="45725" marR="68575" marL="68575" anchor="ctr">
-                    <a:lnL cap="flat" cmpd="sng" w="9525">
-                      <a:solidFill>
-                        <a:srgbClr val="999999"/>
-                      </a:solidFill>
-                      <a:prstDash val="solid"/>
-                      <a:round/>
-                      <a:headEnd len="sm" w="sm" type="none"/>
-                      <a:tailEnd len="sm" w="sm" type="none"/>
-                    </a:lnL>
-                    <a:lnR cap="flat" cmpd="sng" w="9525">
-                      <a:solidFill>
-                        <a:srgbClr val="999999"/>
-                      </a:solidFill>
-                      <a:prstDash val="solid"/>
-                      <a:round/>
-                      <a:headEnd len="sm" w="sm" type="none"/>
-                      <a:tailEnd len="sm" w="sm" type="none"/>
-                    </a:lnR>
-                    <a:lnT cap="flat" cmpd="sng" w="9525">
-                      <a:solidFill>
-                        <a:srgbClr val="999999"/>
-                      </a:solidFill>
-                      <a:prstDash val="solid"/>
-                      <a:round/>
-                      <a:headEnd len="sm" w="sm" type="none"/>
-                      <a:tailEnd len="sm" w="sm" type="none"/>
-                    </a:lnT>
-                    <a:lnB cap="flat" cmpd="sng" w="9525">
-                      <a:solidFill>
-                        <a:srgbClr val="999999"/>
-                      </a:solidFill>
-                      <a:prstDash val="solid"/>
-                      <a:round/>
-                      <a:headEnd len="sm" w="sm" type="none"/>
-                      <a:tailEnd len="sm" w="sm" type="none"/>
-                    </a:lnB>
-                  </a:tcPr>
-                </a:tc>
-              </a:tr>
-              <a:tr h="736600">
-                <a:tc>
-                  <a:txBody>
-                    <a:bodyPr/>
-                    <a:lstStyle/>
-                    <a:p>
-                      <a:pPr indent="0" lvl="0" marL="0" marR="0" rtl="0" algn="l">
-                        <a:spcBef>
-                          <a:spcPts val="0"/>
-                        </a:spcBef>
-                        <a:spcAft>
-                          <a:spcPts val="0"/>
-                        </a:spcAft>
-                        <a:buClr>
-                          <a:schemeClr val="dk1"/>
-                        </a:buClr>
-                        <a:buSzPts val="1800"/>
-                        <a:buFont typeface="Arial"/>
-                        <a:buNone/>
-                      </a:pPr>
-                      <a:br>
-                        <a:rPr lang="ar-AE" sz="1800" u="none" cap="none" strike="noStrike"/>
-                      </a:br>
-                      <a:endParaRPr sz="2400" u="none" cap="none" strike="noStrike"/>
-                    </a:p>
-                    <a:p>
-                      <a:pPr indent="0" lvl="0" marL="0" marR="0" rtl="0" algn="ctr">
-                        <a:spcBef>
-                          <a:spcPts val="0"/>
-                        </a:spcBef>
-                        <a:spcAft>
-                          <a:spcPts val="0"/>
-                        </a:spcAft>
-                        <a:buClr>
-                          <a:srgbClr val="FFFFFF"/>
-                        </a:buClr>
-                        <a:buSzPts val="1800"/>
-                        <a:buFont typeface="Arial"/>
-                        <a:buNone/>
-                      </a:pPr>
-                      <a:r>
-                        <a:rPr b="1" lang="ar-AE" sz="1800" u="none" cap="none" strike="noStrike">
-                          <a:solidFill>
-                            <a:srgbClr val="FFFFFF"/>
-                          </a:solidFill>
-                          <a:latin typeface="Arial"/>
-                          <a:ea typeface="Arial"/>
-                          <a:cs typeface="Arial"/>
-                          <a:sym typeface="Arial"/>
-                        </a:rPr>
-                        <a:t>Interest</a:t>
-                      </a:r>
-                      <a:endParaRPr sz="2400" u="none" cap="none" strike="noStrike"/>
-                    </a:p>
-                  </a:txBody>
-                  <a:tcPr marT="45725" marB="45725" marR="68575" marL="68575">
-                    <a:lnL cap="flat" cmpd="sng" w="9525">
-                      <a:solidFill>
-                        <a:srgbClr val="999999"/>
-                      </a:solidFill>
-                      <a:prstDash val="solid"/>
-                      <a:round/>
-                      <a:headEnd len="sm" w="sm" type="none"/>
-                      <a:tailEnd len="sm" w="sm" type="none"/>
-                    </a:lnL>
-                    <a:lnR cap="flat" cmpd="sng" w="9525">
-                      <a:solidFill>
-                        <a:srgbClr val="999999"/>
-                      </a:solidFill>
-                      <a:prstDash val="solid"/>
-                      <a:round/>
-                      <a:headEnd len="sm" w="sm" type="none"/>
-                      <a:tailEnd len="sm" w="sm" type="none"/>
-                    </a:lnR>
-                    <a:lnT cap="flat" cmpd="sng" w="9525">
-                      <a:solidFill>
-                        <a:srgbClr val="999999"/>
-                      </a:solidFill>
-                      <a:prstDash val="solid"/>
-                      <a:round/>
-                      <a:headEnd len="sm" w="sm" type="none"/>
-                      <a:tailEnd len="sm" w="sm" type="none"/>
-                    </a:lnT>
-                    <a:lnB cap="flat" cmpd="sng" w="9525">
-                      <a:solidFill>
-                        <a:srgbClr val="999999"/>
-                      </a:solidFill>
-                      <a:prstDash val="solid"/>
-                      <a:round/>
-                      <a:headEnd len="sm" w="sm" type="none"/>
-                      <a:tailEnd len="sm" w="sm" type="none"/>
-                    </a:lnB>
-                    <a:solidFill>
-                      <a:srgbClr val="3A3A3A"/>
-                    </a:solidFill>
-                  </a:tcPr>
-                </a:tc>
-                <a:tc>
-                  <a:txBody>
-                    <a:bodyPr/>
-                    <a:lstStyle/>
-                    <a:p>
-                      <a:pPr indent="0" lvl="0" marL="0" marR="0" rtl="0" algn="l">
-                        <a:spcBef>
-                          <a:spcPts val="0"/>
-                        </a:spcBef>
-                        <a:spcAft>
-                          <a:spcPts val="0"/>
-                        </a:spcAft>
-                        <a:buClr>
-                          <a:schemeClr val="dk1"/>
-                        </a:buClr>
-                        <a:buSzPts val="1800"/>
-                        <a:buFont typeface="Arial"/>
-                        <a:buNone/>
-                      </a:pPr>
-                      <a:br>
-                        <a:rPr lang="ar-AE" sz="1800" u="none" cap="none" strike="noStrike"/>
-                      </a:br>
-                      <a:endParaRPr sz="2400" u="none" cap="none" strike="noStrike"/>
-                    </a:p>
-                    <a:p>
-                      <a:pPr indent="0" lvl="0" marL="0" marR="0" rtl="0" algn="ctr">
-                        <a:spcBef>
-                          <a:spcPts val="0"/>
-                        </a:spcBef>
-                        <a:spcAft>
-                          <a:spcPts val="0"/>
-                        </a:spcAft>
-                        <a:buClr>
-                          <a:srgbClr val="FFFFFF"/>
-                        </a:buClr>
-                        <a:buSzPts val="1800"/>
-                        <a:buFont typeface="Arial"/>
-                        <a:buNone/>
-                      </a:pPr>
-                      <a:r>
-                        <a:rPr b="1" lang="ar-AE" sz="1800" u="none" cap="none" strike="noStrike">
-                          <a:solidFill>
-                            <a:srgbClr val="FFFFFF"/>
-                          </a:solidFill>
-                          <a:latin typeface="Arial"/>
-                          <a:ea typeface="Arial"/>
-                          <a:cs typeface="Arial"/>
-                          <a:sym typeface="Arial"/>
-                        </a:rPr>
-                        <a:t>Goals</a:t>
-                      </a:r>
-                      <a:endParaRPr sz="2400" u="none" cap="none" strike="noStrike"/>
-                    </a:p>
-                  </a:txBody>
-                  <a:tcPr marT="45725" marB="45725" marR="68575" marL="68575">
-                    <a:lnL cap="flat" cmpd="sng" w="9525">
-                      <a:solidFill>
-                        <a:srgbClr val="999999"/>
-                      </a:solidFill>
-                      <a:prstDash val="solid"/>
-                      <a:round/>
-                      <a:headEnd len="sm" w="sm" type="none"/>
-                      <a:tailEnd len="sm" w="sm" type="none"/>
-                    </a:lnL>
-                    <a:lnR cap="flat" cmpd="sng" w="9525">
-                      <a:solidFill>
-                        <a:srgbClr val="999999"/>
-                      </a:solidFill>
-                      <a:prstDash val="solid"/>
-                      <a:round/>
-                      <a:headEnd len="sm" w="sm" type="none"/>
-                      <a:tailEnd len="sm" w="sm" type="none"/>
-                    </a:lnR>
-                    <a:lnT cap="flat" cmpd="sng" w="9525">
-                      <a:solidFill>
-                        <a:srgbClr val="999999"/>
-                      </a:solidFill>
-                      <a:prstDash val="solid"/>
-                      <a:round/>
-                      <a:headEnd len="sm" w="sm" type="none"/>
-                      <a:tailEnd len="sm" w="sm" type="none"/>
-                    </a:lnT>
-                    <a:lnB cap="flat" cmpd="sng" w="9525">
-                      <a:solidFill>
-                        <a:srgbClr val="999999"/>
-                      </a:solidFill>
-                      <a:prstDash val="solid"/>
-                      <a:round/>
-                      <a:headEnd len="sm" w="sm" type="none"/>
-                      <a:tailEnd len="sm" w="sm" type="none"/>
-                    </a:lnB>
-                    <a:solidFill>
-                      <a:srgbClr val="3A3A3A"/>
-                    </a:solidFill>
-                  </a:tcPr>
-                </a:tc>
-                <a:tc>
-                  <a:txBody>
-                    <a:bodyPr/>
-                    <a:lstStyle/>
-                    <a:p>
-                      <a:pPr indent="0" lvl="0" marL="0" marR="0" rtl="0" algn="l">
-                        <a:spcBef>
-                          <a:spcPts val="0"/>
-                        </a:spcBef>
-                        <a:spcAft>
-                          <a:spcPts val="0"/>
-                        </a:spcAft>
-                        <a:buClr>
-                          <a:schemeClr val="dk1"/>
-                        </a:buClr>
-                        <a:buSzPts val="1800"/>
-                        <a:buFont typeface="Arial"/>
-                        <a:buNone/>
-                      </a:pPr>
-                      <a:br>
-                        <a:rPr lang="ar-AE" sz="1800" u="none" cap="none" strike="noStrike"/>
-                      </a:br>
-                      <a:endParaRPr sz="2400" u="none" cap="none" strike="noStrike"/>
-                    </a:p>
-                    <a:p>
-                      <a:pPr indent="0" lvl="0" marL="0" marR="0" rtl="0" algn="ctr">
-                        <a:spcBef>
-                          <a:spcPts val="0"/>
-                        </a:spcBef>
-                        <a:spcAft>
-                          <a:spcPts val="0"/>
-                        </a:spcAft>
-                        <a:buClr>
-                          <a:srgbClr val="FFFFFF"/>
-                        </a:buClr>
-                        <a:buSzPts val="1800"/>
-                        <a:buFont typeface="Arial"/>
-                        <a:buNone/>
-                      </a:pPr>
-                      <a:r>
-                        <a:rPr b="1" lang="ar-AE" sz="1800" u="none" cap="none" strike="noStrike">
-                          <a:solidFill>
-                            <a:srgbClr val="FFFFFF"/>
-                          </a:solidFill>
-                          <a:latin typeface="Arial"/>
-                          <a:ea typeface="Arial"/>
-                          <a:cs typeface="Arial"/>
-                          <a:sym typeface="Arial"/>
-                        </a:rPr>
-                        <a:t>Barriers</a:t>
-                      </a:r>
-                      <a:endParaRPr sz="2400" u="none" cap="none" strike="noStrike"/>
-                    </a:p>
-                  </a:txBody>
-                  <a:tcPr marT="45725" marB="45725" marR="68575" marL="68575">
-                    <a:lnL cap="flat" cmpd="sng" w="9525">
-                      <a:solidFill>
-                        <a:srgbClr val="999999"/>
-                      </a:solidFill>
-                      <a:prstDash val="solid"/>
-                      <a:round/>
-                      <a:headEnd len="sm" w="sm" type="none"/>
-                      <a:tailEnd len="sm" w="sm" type="none"/>
-                    </a:lnL>
-                    <a:lnR cap="flat" cmpd="sng" w="9525">
-                      <a:solidFill>
-                        <a:srgbClr val="999999"/>
-                      </a:solidFill>
-                      <a:prstDash val="solid"/>
-                      <a:round/>
-                      <a:headEnd len="sm" w="sm" type="none"/>
-                      <a:tailEnd len="sm" w="sm" type="none"/>
-                    </a:lnR>
-                    <a:lnT cap="flat" cmpd="sng" w="9525">
-                      <a:solidFill>
-                        <a:srgbClr val="999999"/>
-                      </a:solidFill>
-                      <a:prstDash val="solid"/>
-                      <a:round/>
-                      <a:headEnd len="sm" w="sm" type="none"/>
-                      <a:tailEnd len="sm" w="sm" type="none"/>
-                    </a:lnT>
-                    <a:lnB cap="flat" cmpd="sng" w="9525">
-                      <a:solidFill>
-                        <a:srgbClr val="999999"/>
-                      </a:solidFill>
-                      <a:prstDash val="solid"/>
-                      <a:round/>
-                      <a:headEnd len="sm" w="sm" type="none"/>
-                      <a:tailEnd len="sm" w="sm" type="none"/>
-                    </a:lnB>
-                    <a:solidFill>
-                      <a:srgbClr val="3A3A3A"/>
-                    </a:solidFill>
-                  </a:tcPr>
-                </a:tc>
-                <a:tc>
-                  <a:txBody>
-                    <a:bodyPr/>
-                    <a:lstStyle/>
-                    <a:p>
-                      <a:pPr indent="0" lvl="0" marL="0" marR="0" rtl="0" algn="l">
-                        <a:spcBef>
-                          <a:spcPts val="0"/>
-                        </a:spcBef>
-                        <a:spcAft>
-                          <a:spcPts val="0"/>
-                        </a:spcAft>
-                        <a:buClr>
-                          <a:schemeClr val="dk1"/>
-                        </a:buClr>
-                        <a:buSzPts val="1800"/>
-                        <a:buFont typeface="Arial"/>
-                        <a:buNone/>
-                      </a:pPr>
-                      <a:br>
-                        <a:rPr lang="ar-AE" sz="1800" u="none" cap="none" strike="noStrike"/>
-                      </a:br>
-                      <a:endParaRPr sz="2400" u="none" cap="none" strike="noStrike"/>
-                    </a:p>
-                    <a:p>
-                      <a:pPr indent="0" lvl="0" marL="0" marR="0" rtl="0" algn="ctr">
-                        <a:spcBef>
-                          <a:spcPts val="0"/>
-                        </a:spcBef>
-                        <a:spcAft>
-                          <a:spcPts val="0"/>
-                        </a:spcAft>
-                        <a:buClr>
-                          <a:srgbClr val="FFFFFF"/>
-                        </a:buClr>
-                        <a:buSzPts val="1800"/>
-                        <a:buFont typeface="Arial"/>
-                        <a:buNone/>
-                      </a:pPr>
-                      <a:r>
-                        <a:rPr b="1" lang="ar-AE" sz="1800" u="none" cap="none" strike="noStrike">
-                          <a:solidFill>
-                            <a:srgbClr val="FFFFFF"/>
-                          </a:solidFill>
-                          <a:latin typeface="Arial"/>
-                          <a:ea typeface="Arial"/>
-                          <a:cs typeface="Arial"/>
-                          <a:sym typeface="Arial"/>
-                        </a:rPr>
-                        <a:t>Identifiers</a:t>
-                      </a:r>
-                      <a:endParaRPr sz="2400" u="none" cap="none" strike="noStrike"/>
-                    </a:p>
-                  </a:txBody>
-                  <a:tcPr marT="45725" marB="45725" marR="68575" marL="68575">
-                    <a:lnL cap="flat" cmpd="sng" w="9525">
-                      <a:solidFill>
-                        <a:srgbClr val="999999"/>
-                      </a:solidFill>
-                      <a:prstDash val="solid"/>
-                      <a:round/>
-                      <a:headEnd len="sm" w="sm" type="none"/>
-                      <a:tailEnd len="sm" w="sm" type="none"/>
-                    </a:lnL>
-                    <a:lnR cap="flat" cmpd="sng" w="9525">
-                      <a:solidFill>
-                        <a:srgbClr val="999999"/>
-                      </a:solidFill>
-                      <a:prstDash val="solid"/>
-                      <a:round/>
-                      <a:headEnd len="sm" w="sm" type="none"/>
-                      <a:tailEnd len="sm" w="sm" type="none"/>
-                    </a:lnR>
-                    <a:lnT cap="flat" cmpd="sng" w="9525">
-                      <a:solidFill>
-                        <a:srgbClr val="999999"/>
-                      </a:solidFill>
-                      <a:prstDash val="solid"/>
-                      <a:round/>
-                      <a:headEnd len="sm" w="sm" type="none"/>
-                      <a:tailEnd len="sm" w="sm" type="none"/>
-                    </a:lnT>
-                    <a:lnB cap="flat" cmpd="sng" w="9525">
-                      <a:solidFill>
-                        <a:srgbClr val="999999"/>
-                      </a:solidFill>
-                      <a:prstDash val="solid"/>
-                      <a:round/>
-                      <a:headEnd len="sm" w="sm" type="none"/>
-                      <a:tailEnd len="sm" w="sm" type="none"/>
-                    </a:lnB>
-                    <a:solidFill>
-                      <a:srgbClr val="3A3A3A"/>
-                    </a:solidFill>
-                  </a:tcPr>
-                </a:tc>
-              </a:tr>
-              <a:tr h="1313175">
-                <a:tc>
-                  <a:txBody>
-                    <a:bodyPr/>
-                    <a:lstStyle/>
-                    <a:p>
-                      <a:pPr indent="0" lvl="0" marL="0" marR="0" rtl="1" algn="ctr">
-                        <a:spcBef>
-                          <a:spcPts val="0"/>
-                        </a:spcBef>
-                        <a:spcAft>
-                          <a:spcPts val="0"/>
-                        </a:spcAft>
-                        <a:buNone/>
-                      </a:pPr>
-                      <a:r>
-                        <a:rPr b="0" lang="ar-AE" sz="1600" u="none" cap="none" strike="noStrike">
-                          <a:latin typeface="Consolas"/>
-                          <a:ea typeface="Consolas"/>
-                          <a:cs typeface="Consolas"/>
-                          <a:sym typeface="Consolas"/>
-                        </a:rPr>
-                        <a:t>ألعاب الموبايلfreefire– مشاهدة كرتون -  يوتيوب – العب كره القدم</a:t>
-                      </a:r>
-                      <a:endParaRPr b="0" sz="2400" u="none" cap="none" strike="noStrike"/>
-                    </a:p>
-                    <a:p>
-                      <a:pPr indent="0" lvl="0" marL="0" marR="0" rtl="0" algn="l">
-                        <a:spcBef>
-                          <a:spcPts val="0"/>
-                        </a:spcBef>
-                        <a:spcAft>
-                          <a:spcPts val="0"/>
-                        </a:spcAft>
-                        <a:buNone/>
-                      </a:pPr>
-                      <a:br>
-                        <a:rPr lang="ar-AE" sz="1800" u="none" cap="none" strike="noStrike"/>
-                      </a:br>
-                      <a:endParaRPr sz="2400" u="none" cap="none" strike="noStrike"/>
-                    </a:p>
-                  </a:txBody>
-                  <a:tcPr marT="45725" marB="45725" marR="68575" marL="68575" anchor="ctr">
-                    <a:lnL cap="flat" cmpd="sng" w="9525">
-                      <a:solidFill>
-                        <a:srgbClr val="999999"/>
-                      </a:solidFill>
-                      <a:prstDash val="solid"/>
-                      <a:round/>
-                      <a:headEnd len="sm" w="sm" type="none"/>
-                      <a:tailEnd len="sm" w="sm" type="none"/>
-                    </a:lnL>
-                    <a:lnR cap="flat" cmpd="sng" w="9525">
-                      <a:solidFill>
-                        <a:srgbClr val="999999"/>
-                      </a:solidFill>
-                      <a:prstDash val="solid"/>
-                      <a:round/>
-                      <a:headEnd len="sm" w="sm" type="none"/>
-                      <a:tailEnd len="sm" w="sm" type="none"/>
-                    </a:lnR>
-                    <a:lnT cap="flat" cmpd="sng" w="9525">
-                      <a:solidFill>
-                        <a:srgbClr val="999999"/>
-                      </a:solidFill>
-                      <a:prstDash val="solid"/>
-                      <a:round/>
-                      <a:headEnd len="sm" w="sm" type="none"/>
-                      <a:tailEnd len="sm" w="sm" type="none"/>
-                    </a:lnT>
-                    <a:lnB cap="flat" cmpd="sng" w="9525">
-                      <a:solidFill>
-                        <a:srgbClr val="999999"/>
-                      </a:solidFill>
-                      <a:prstDash val="solid"/>
-                      <a:round/>
-                      <a:headEnd len="sm" w="sm" type="none"/>
-                      <a:tailEnd len="sm" w="sm" type="none"/>
-                    </a:lnB>
-                  </a:tcPr>
-                </a:tc>
-                <a:tc>
-                  <a:txBody>
-                    <a:bodyPr/>
-                    <a:lstStyle/>
-                    <a:p>
-                      <a:pPr indent="0" lvl="0" marL="0" marR="0" rtl="0" algn="ctr">
-                        <a:spcBef>
-                          <a:spcPts val="0"/>
-                        </a:spcBef>
-                        <a:spcAft>
-                          <a:spcPts val="0"/>
-                        </a:spcAft>
-                        <a:buClr>
-                          <a:schemeClr val="dk1"/>
-                        </a:buClr>
-                        <a:buSzPts val="1800"/>
-                        <a:buFont typeface="Arial"/>
-                        <a:buNone/>
-                      </a:pPr>
-                      <a:r>
-                        <a:rPr lang="ar-AE" sz="1800" u="none" cap="none" strike="noStrike">
-                          <a:latin typeface="Arial"/>
-                          <a:ea typeface="Arial"/>
-                          <a:cs typeface="Arial"/>
-                          <a:sym typeface="Arial"/>
-                        </a:rPr>
-                        <a:t> اللعب والترفيه بعيد عن الموبايل </a:t>
-                      </a:r>
-                      <a:endParaRPr sz="2400" u="none" cap="none" strike="noStrike">
-                        <a:latin typeface="Arial"/>
-                        <a:ea typeface="Arial"/>
-                        <a:cs typeface="Arial"/>
-                        <a:sym typeface="Arial"/>
-                      </a:endParaRPr>
-                    </a:p>
-                    <a:p>
-                      <a:pPr indent="0" lvl="0" marL="0" marR="0" rtl="0" algn="ctr">
-                        <a:spcBef>
-                          <a:spcPts val="0"/>
-                        </a:spcBef>
-                        <a:spcAft>
-                          <a:spcPts val="0"/>
-                        </a:spcAft>
-                        <a:buClr>
-                          <a:schemeClr val="dk1"/>
-                        </a:buClr>
-                        <a:buSzPts val="1800"/>
-                        <a:buFont typeface="Arial"/>
-                        <a:buNone/>
-                      </a:pPr>
-                      <a:r>
-                        <a:rPr lang="ar-AE" sz="1800" u="none" cap="none" strike="noStrike">
-                          <a:latin typeface="Arial"/>
-                          <a:ea typeface="Arial"/>
-                          <a:cs typeface="Arial"/>
-                          <a:sym typeface="Arial"/>
-                        </a:rPr>
-                        <a:t>تنميه مهارات جديده </a:t>
-                      </a:r>
-                      <a:r>
-                        <a:rPr lang="ar-AE" sz="1800">
-                          <a:latin typeface="Arial"/>
-                          <a:ea typeface="Arial"/>
-                          <a:cs typeface="Arial"/>
-                          <a:sym typeface="Arial"/>
-                        </a:rPr>
-                        <a:t>ـ</a:t>
-                      </a:r>
-                      <a:r>
-                        <a:rPr lang="ar-AE" sz="1800" u="none" cap="none" strike="noStrike">
-                          <a:latin typeface="Arial"/>
-                          <a:ea typeface="Arial"/>
-                          <a:cs typeface="Arial"/>
-                          <a:sym typeface="Arial"/>
-                        </a:rPr>
-                        <a:t>رسم - </a:t>
-                      </a:r>
-                      <a:r>
-                        <a:rPr lang="ar-AE" sz="1800">
-                          <a:latin typeface="Arial"/>
-                          <a:ea typeface="Arial"/>
-                          <a:cs typeface="Arial"/>
-                          <a:sym typeface="Arial"/>
-                        </a:rPr>
-                        <a:t>رياضة</a:t>
-                      </a:r>
-                      <a:r>
-                        <a:rPr lang="ar-AE" sz="1800" u="none" cap="none" strike="noStrike">
-                          <a:latin typeface="Arial"/>
-                          <a:ea typeface="Arial"/>
-                          <a:cs typeface="Arial"/>
-                          <a:sym typeface="Arial"/>
-                        </a:rPr>
-                        <a:t>)</a:t>
-                      </a:r>
-                      <a:endParaRPr sz="2400" u="none" cap="none" strike="noStrike"/>
-                    </a:p>
-                    <a:p>
-                      <a:pPr indent="0" lvl="0" marL="0" marR="0" rtl="1" algn="ctr">
-                        <a:spcBef>
-                          <a:spcPts val="0"/>
-                        </a:spcBef>
-                        <a:spcAft>
-                          <a:spcPts val="0"/>
-                        </a:spcAft>
-                        <a:buClr>
-                          <a:schemeClr val="dk1"/>
-                        </a:buClr>
-                        <a:buSzPts val="1800"/>
-                        <a:buFont typeface="Arial"/>
-                        <a:buNone/>
-                      </a:pPr>
-                      <a:r>
-                        <a:rPr lang="ar-AE" sz="1800" u="none" cap="none" strike="noStrike">
-                          <a:latin typeface="Arial"/>
-                          <a:ea typeface="Arial"/>
-                          <a:cs typeface="Arial"/>
-                          <a:sym typeface="Arial"/>
-                        </a:rPr>
-                        <a:t>-    تكوين صداقات في </a:t>
-                      </a:r>
-                      <a:r>
-                        <a:rPr lang="ar-AE" sz="1800">
-                          <a:latin typeface="Arial"/>
-                          <a:ea typeface="Arial"/>
-                          <a:cs typeface="Arial"/>
-                          <a:sym typeface="Arial"/>
-                        </a:rPr>
-                        <a:t>المدرسة</a:t>
-                      </a:r>
-                      <a:r>
-                        <a:rPr lang="ar-AE" sz="1800" u="none" cap="none" strike="noStrike">
-                          <a:latin typeface="Arial"/>
-                          <a:ea typeface="Arial"/>
-                          <a:cs typeface="Arial"/>
-                          <a:sym typeface="Arial"/>
-                        </a:rPr>
-                        <a:t> </a:t>
-                      </a:r>
-                      <a:endParaRPr sz="2400" u="none" cap="none" strike="noStrike"/>
-                    </a:p>
-                    <a:p>
-                      <a:pPr indent="0" lvl="0" marL="0" marR="0" rtl="1" algn="ctr">
-                        <a:spcBef>
-                          <a:spcPts val="0"/>
-                        </a:spcBef>
-                        <a:spcAft>
-                          <a:spcPts val="0"/>
-                        </a:spcAft>
-                        <a:buClr>
-                          <a:schemeClr val="dk1"/>
-                        </a:buClr>
-                        <a:buSzPts val="1800"/>
-                        <a:buFont typeface="Arial"/>
-                        <a:buNone/>
-                      </a:pPr>
-                      <a:r>
-                        <a:rPr lang="ar-AE" sz="1800" u="none" cap="none" strike="noStrike">
-                          <a:latin typeface="Arial"/>
-                          <a:ea typeface="Arial"/>
-                          <a:cs typeface="Arial"/>
-                          <a:sym typeface="Arial"/>
-                        </a:rPr>
-                        <a:t>- المشاركة مع الاهل وقت اللعب)</a:t>
-                      </a:r>
-                      <a:endParaRPr sz="2400" u="none" cap="none" strike="noStrike"/>
-                    </a:p>
-                  </a:txBody>
-                  <a:tcPr marT="45725" marB="45725" marR="68575" marL="68575">
-                    <a:lnL cap="flat" cmpd="sng" w="9525">
-                      <a:solidFill>
-                        <a:srgbClr val="999999"/>
-                      </a:solidFill>
-                      <a:prstDash val="solid"/>
-                      <a:round/>
-                      <a:headEnd len="sm" w="sm" type="none"/>
-                      <a:tailEnd len="sm" w="sm" type="none"/>
-                    </a:lnL>
-                    <a:lnR cap="flat" cmpd="sng" w="9525">
-                      <a:solidFill>
-                        <a:srgbClr val="999999"/>
-                      </a:solidFill>
-                      <a:prstDash val="solid"/>
-                      <a:round/>
-                      <a:headEnd len="sm" w="sm" type="none"/>
-                      <a:tailEnd len="sm" w="sm" type="none"/>
-                    </a:lnR>
-                    <a:lnT cap="flat" cmpd="sng" w="9525">
-                      <a:solidFill>
-                        <a:srgbClr val="999999"/>
-                      </a:solidFill>
-                      <a:prstDash val="solid"/>
-                      <a:round/>
-                      <a:headEnd len="sm" w="sm" type="none"/>
-                      <a:tailEnd len="sm" w="sm" type="none"/>
-                    </a:lnT>
-                    <a:lnB cap="flat" cmpd="sng" w="9525">
-                      <a:solidFill>
-                        <a:srgbClr val="999999"/>
-                      </a:solidFill>
-                      <a:prstDash val="solid"/>
-                      <a:round/>
-                      <a:headEnd len="sm" w="sm" type="none"/>
-                      <a:tailEnd len="sm" w="sm" type="none"/>
-                    </a:lnB>
-                  </a:tcPr>
-                </a:tc>
-                <a:tc>
-                  <a:txBody>
-                    <a:bodyPr/>
-                    <a:lstStyle/>
-                    <a:p>
-                      <a:pPr indent="0" lvl="0" marL="0" marR="0" rtl="0" algn="ctr">
-                        <a:spcBef>
-                          <a:spcPts val="0"/>
-                        </a:spcBef>
-                        <a:spcAft>
-                          <a:spcPts val="0"/>
-                        </a:spcAft>
-                        <a:buClr>
-                          <a:schemeClr val="dk1"/>
-                        </a:buClr>
-                        <a:buSzPts val="1800"/>
-                        <a:buFont typeface="Arial"/>
-                        <a:buNone/>
-                      </a:pPr>
-                      <a:r>
-                        <a:rPr lang="ar-AE" sz="1800" u="none" cap="none" strike="noStrike">
-                          <a:latin typeface="Arial"/>
-                          <a:ea typeface="Arial"/>
-                          <a:cs typeface="Arial"/>
-                          <a:sym typeface="Arial"/>
-                        </a:rPr>
-                        <a:t> اعتبار الموبايل وسيلة التسلية الاساسية </a:t>
-                      </a:r>
-                      <a:endParaRPr sz="2400" u="none" cap="none" strike="noStrike">
-                        <a:latin typeface="Arial"/>
-                        <a:ea typeface="Arial"/>
-                        <a:cs typeface="Arial"/>
-                        <a:sym typeface="Arial"/>
-                      </a:endParaRPr>
-                    </a:p>
-                    <a:p>
-                      <a:pPr indent="0" lvl="0" marL="0" marR="0" rtl="0" algn="ctr">
-                        <a:spcBef>
-                          <a:spcPts val="0"/>
-                        </a:spcBef>
-                        <a:spcAft>
-                          <a:spcPts val="0"/>
-                        </a:spcAft>
-                        <a:buClr>
-                          <a:schemeClr val="dk1"/>
-                        </a:buClr>
-                        <a:buSzPts val="1800"/>
-                        <a:buFont typeface="Arial"/>
-                        <a:buNone/>
-                      </a:pPr>
-                      <a:r>
-                        <a:rPr lang="ar-AE" sz="1800" u="none" cap="none" strike="noStrike">
-                          <a:latin typeface="Arial"/>
-                          <a:ea typeface="Arial"/>
-                          <a:cs typeface="Arial"/>
-                          <a:sym typeface="Arial"/>
-                        </a:rPr>
-                        <a:t>صعوبه اقناع الطفل بأن فيه بدايل ممتعة زي الالعاب</a:t>
-                      </a:r>
-                      <a:endParaRPr sz="2400" u="none" cap="none" strike="noStrike"/>
-                    </a:p>
-                    <a:p>
-                      <a:pPr indent="0" lvl="0" marL="0" marR="0" rtl="0" algn="ctr">
-                        <a:spcBef>
-                          <a:spcPts val="0"/>
-                        </a:spcBef>
-                        <a:spcAft>
-                          <a:spcPts val="0"/>
-                        </a:spcAft>
-                        <a:buClr>
-                          <a:schemeClr val="dk1"/>
-                        </a:buClr>
-                        <a:buSzPts val="1800"/>
-                        <a:buFont typeface="Arial"/>
-                        <a:buNone/>
-                      </a:pPr>
-                      <a:r>
-                        <a:rPr lang="ar-AE" sz="1800" u="none" cap="none" strike="noStrike">
-                          <a:latin typeface="Arial"/>
-                          <a:ea typeface="Arial"/>
-                          <a:cs typeface="Arial"/>
-                          <a:sym typeface="Arial"/>
-                        </a:rPr>
-                        <a:t>قلة وعي بعض الاهالي بخطورة الموبايل علي تركيز الطفل ونومه</a:t>
-                      </a:r>
-                      <a:endParaRPr sz="2400" u="none" cap="none" strike="noStrike"/>
-                    </a:p>
-                    <a:p>
-                      <a:pPr indent="0" lvl="0" marL="0" marR="0" rtl="0" algn="l">
-                        <a:spcBef>
-                          <a:spcPts val="0"/>
-                        </a:spcBef>
-                        <a:spcAft>
-                          <a:spcPts val="0"/>
-                        </a:spcAft>
-                        <a:buClr>
-                          <a:schemeClr val="dk1"/>
-                        </a:buClr>
-                        <a:buSzPts val="1800"/>
-                        <a:buFont typeface="Arial"/>
-                        <a:buNone/>
-                      </a:pPr>
-                      <a:br>
-                        <a:rPr lang="ar-AE" sz="1800" u="none" cap="none" strike="noStrike"/>
-                      </a:br>
-                      <a:endParaRPr sz="2400" u="none" cap="none" strike="noStrike"/>
-                    </a:p>
-                  </a:txBody>
-                  <a:tcPr marT="45725" marB="45725" marR="68575" marL="68575">
-                    <a:lnL cap="flat" cmpd="sng" w="9525">
-                      <a:solidFill>
-                        <a:srgbClr val="999999"/>
-                      </a:solidFill>
-                      <a:prstDash val="solid"/>
-                      <a:round/>
-                      <a:headEnd len="sm" w="sm" type="none"/>
-                      <a:tailEnd len="sm" w="sm" type="none"/>
-                    </a:lnL>
-                    <a:lnR cap="flat" cmpd="sng" w="9525">
-                      <a:solidFill>
-                        <a:srgbClr val="999999"/>
-                      </a:solidFill>
-                      <a:prstDash val="solid"/>
-                      <a:round/>
-                      <a:headEnd len="sm" w="sm" type="none"/>
-                      <a:tailEnd len="sm" w="sm" type="none"/>
-                    </a:lnR>
-                    <a:lnT cap="flat" cmpd="sng" w="9525">
-                      <a:solidFill>
-                        <a:srgbClr val="999999"/>
-                      </a:solidFill>
-                      <a:prstDash val="solid"/>
-                      <a:round/>
-                      <a:headEnd len="sm" w="sm" type="none"/>
-                      <a:tailEnd len="sm" w="sm" type="none"/>
-                    </a:lnT>
-                    <a:lnB cap="flat" cmpd="sng" w="9525">
-                      <a:solidFill>
-                        <a:srgbClr val="999999"/>
-                      </a:solidFill>
-                      <a:prstDash val="solid"/>
-                      <a:round/>
-                      <a:headEnd len="sm" w="sm" type="none"/>
-                      <a:tailEnd len="sm" w="sm" type="none"/>
-                    </a:lnB>
-                  </a:tcPr>
-                </a:tc>
-                <a:tc>
-                  <a:txBody>
-                    <a:bodyPr/>
-                    <a:lstStyle/>
-                    <a:p>
-                      <a:pPr indent="0" lvl="0" marL="0" marR="0" rtl="0" algn="ctr">
-                        <a:spcBef>
-                          <a:spcPts val="0"/>
-                        </a:spcBef>
-                        <a:spcAft>
-                          <a:spcPts val="0"/>
-                        </a:spcAft>
-                        <a:buClr>
-                          <a:schemeClr val="dk1"/>
-                        </a:buClr>
-                        <a:buSzPts val="1800"/>
-                        <a:buFont typeface="Arial"/>
-                        <a:buNone/>
-                      </a:pPr>
-                      <a:r>
-                        <a:rPr lang="ar-AE" sz="1800" u="none" cap="none" strike="noStrike">
-                          <a:latin typeface="Arial"/>
-                          <a:ea typeface="Arial"/>
-                          <a:cs typeface="Arial"/>
-                          <a:sym typeface="Arial"/>
-                        </a:rPr>
-                        <a:t>minecraft</a:t>
-                      </a:r>
-                      <a:endParaRPr sz="2400" u="none" cap="none" strike="noStrike">
-                        <a:latin typeface="Arial"/>
-                        <a:ea typeface="Arial"/>
-                        <a:cs typeface="Arial"/>
-                        <a:sym typeface="Arial"/>
-                      </a:endParaRPr>
-                    </a:p>
-                    <a:p>
-                      <a:pPr indent="0" lvl="0" marL="0" marR="0" rtl="0" algn="ctr">
-                        <a:spcBef>
-                          <a:spcPts val="0"/>
-                        </a:spcBef>
-                        <a:spcAft>
-                          <a:spcPts val="0"/>
-                        </a:spcAft>
-                        <a:buClr>
-                          <a:schemeClr val="dk1"/>
-                        </a:buClr>
-                        <a:buSzPts val="1800"/>
-                        <a:buFont typeface="Arial"/>
-                        <a:buNone/>
-                      </a:pPr>
-                      <a:r>
-                        <a:rPr lang="ar-AE" sz="1800" u="none" cap="none" strike="noStrike">
-                          <a:latin typeface="Arial"/>
-                          <a:ea typeface="Arial"/>
-                          <a:cs typeface="Arial"/>
-                          <a:sym typeface="Arial"/>
-                        </a:rPr>
-                        <a:t>YouTube</a:t>
-                      </a:r>
-                      <a:endParaRPr sz="2400" u="none" cap="none" strike="noStrike"/>
-                    </a:p>
-                    <a:p>
-                      <a:pPr indent="0" lvl="0" marL="0" marR="0" rtl="0" algn="ctr">
-                        <a:spcBef>
-                          <a:spcPts val="0"/>
-                        </a:spcBef>
-                        <a:spcAft>
-                          <a:spcPts val="0"/>
-                        </a:spcAft>
-                        <a:buClr>
-                          <a:schemeClr val="dk1"/>
-                        </a:buClr>
-                        <a:buSzPts val="1800"/>
-                        <a:buFont typeface="Arial"/>
-                        <a:buNone/>
-                      </a:pPr>
-                      <a:r>
-                        <a:rPr lang="ar-AE" sz="1800" u="none" cap="none" strike="noStrike">
-                          <a:latin typeface="Arial"/>
-                          <a:ea typeface="Arial"/>
-                          <a:cs typeface="Arial"/>
-                          <a:sym typeface="Arial"/>
-                        </a:rPr>
-                        <a:t>TikTok</a:t>
-                      </a:r>
-                      <a:endParaRPr sz="1800" u="none" cap="none" strike="noStrike">
-                        <a:latin typeface="Arial"/>
-                        <a:ea typeface="Arial"/>
-                        <a:cs typeface="Arial"/>
-                        <a:sym typeface="Arial"/>
-                      </a:endParaRPr>
-                    </a:p>
-                    <a:p>
-                      <a:pPr indent="0" lvl="0" marL="0" marR="0" rtl="0" algn="ctr">
-                        <a:spcBef>
-                          <a:spcPts val="0"/>
-                        </a:spcBef>
-                        <a:spcAft>
-                          <a:spcPts val="0"/>
-                        </a:spcAft>
-                        <a:buClr>
-                          <a:schemeClr val="dk1"/>
-                        </a:buClr>
-                        <a:buSzPts val="1800"/>
-                        <a:buFont typeface="Arial"/>
-                        <a:buNone/>
-                      </a:pPr>
-                      <a:r>
-                        <a:t/>
-                      </a:r>
-                      <a:endParaRPr sz="1800">
-                        <a:latin typeface="Arial"/>
-                        <a:ea typeface="Arial"/>
-                        <a:cs typeface="Arial"/>
-                        <a:sym typeface="Arial"/>
-                      </a:endParaRPr>
-                    </a:p>
-                  </a:txBody>
-                  <a:tcPr marT="45725" marB="45725" marR="68575" marL="68575">
-                    <a:lnL cap="flat" cmpd="sng" w="9525">
-                      <a:solidFill>
-                        <a:srgbClr val="999999"/>
-                      </a:solidFill>
-                      <a:prstDash val="solid"/>
-                      <a:round/>
-                      <a:headEnd len="sm" w="sm" type="none"/>
-                      <a:tailEnd len="sm" w="sm" type="none"/>
-                    </a:lnL>
-                    <a:lnR cap="flat" cmpd="sng" w="9525">
-                      <a:solidFill>
-                        <a:srgbClr val="999999"/>
-                      </a:solidFill>
-                      <a:prstDash val="solid"/>
-                      <a:round/>
-                      <a:headEnd len="sm" w="sm" type="none"/>
-                      <a:tailEnd len="sm" w="sm" type="none"/>
-                    </a:lnR>
-                    <a:lnT cap="flat" cmpd="sng" w="9525">
-                      <a:solidFill>
-                        <a:srgbClr val="999999"/>
-                      </a:solidFill>
-                      <a:prstDash val="solid"/>
-                      <a:round/>
-                      <a:headEnd len="sm" w="sm" type="none"/>
-                      <a:tailEnd len="sm" w="sm" type="none"/>
-                    </a:lnT>
-                    <a:lnB cap="flat" cmpd="sng" w="9525">
-                      <a:solidFill>
-                        <a:srgbClr val="999999"/>
-                      </a:solidFill>
-                      <a:prstDash val="solid"/>
-                      <a:round/>
-                      <a:headEnd len="sm" w="sm" type="none"/>
-                      <a:tailEnd len="sm" w="sm" type="none"/>
-                    </a:lnB>
-                  </a:tcPr>
-                </a:tc>
-              </a:tr>
-            </a:tbl>
-          </a:graphicData>
-        </a:graphic>
-      </p:graphicFrame>
-    </p:spTree>
-  </p:cSld>
-  <p:clrMapOvr>
-    <a:masterClrMapping/>
-  </p:clrMapOvr>
-</p:sld>
-</file>
-
-<file path=ppt/slides/slide16.xml><?xml version="1.0" encoding="utf-8"?>
-<p:sld xmlns:a="http://schemas.openxmlformats.org/drawingml/2006/main" xmlns:r="http://schemas.openxmlformats.org/officeDocument/2006/relationships" xmlns:mc="http://schemas.openxmlformats.org/markup-compatibility/2006" xmlns:mv="urn:schemas-microsoft-com:mac:vml" xmlns:p="http://schemas.openxmlformats.org/presentationml/2006/main" xmlns:c="http://schemas.openxmlformats.org/drawingml/2006/chart" xmlns:dgm="http://schemas.openxmlformats.org/drawingml/2006/diagram" xmlns:o="urn:schemas-microsoft-com:office:office" xmlns:v="urn:schemas-microsoft-com:vml" xmlns:pvml="urn:schemas-microsoft-com:office:powerpoint" xmlns:com="http://schemas.openxmlformats.org/drawingml/2006/compatibility" xmlns:p14="http://schemas.microsoft.com/office/powerpoint/2010/main" xmlns:p15="http://schemas.microsoft.com/office/powerpoint/2012/main" xmlns:ahyp="http://schemas.microsoft.com/office/drawing/2018/hyperlinkcolor">
-  <p:cSld>
-    <p:spTree>
-      <p:nvGrpSpPr>
-        <p:cNvPr id="212" name="Shape 212"/>
-        <p:cNvGrpSpPr/>
-        <p:nvPr/>
-      </p:nvGrpSpPr>
-      <p:grpSpPr>
-        <a:xfrm>
-          <a:off x="0" y="0"/>
-          <a:ext cx="0" cy="0"/>
-          <a:chOff x="0" y="0"/>
-          <a:chExt cx="0" cy="0"/>
-        </a:xfrm>
-      </p:grpSpPr>
-      <p:graphicFrame>
-        <p:nvGraphicFramePr>
-          <p:cNvPr id="213" name="Google Shape;213;p14"/>
+          <p:cNvPr id="207" name="Google Shape;207;p14"/>
           <p:cNvGraphicFramePr/>
           <p:nvPr/>
         </p:nvGraphicFramePr>
@@ -17431,7 +15125,7 @@
             <a:tbl>
               <a:tblPr bandRow="1">
                 <a:noFill/>
-                <a:tableStyleId>{84F299B2-7866-4EFB-95E6-AAF9E077ECFF}</a:tableStyleId>
+                <a:tableStyleId>{2E805853-DA08-47E0-B8B1-5B519B90ADBB}</a:tableStyleId>
               </a:tblPr>
               <a:tblGrid>
                 <a:gridCol w="3048000"/>
@@ -19475,12 +17169,12 @@
 </p:sld>
 </file>
 
-<file path=ppt/slides/slide17.xml><?xml version="1.0" encoding="utf-8"?>
+<file path=ppt/slides/slide16.xml><?xml version="1.0" encoding="utf-8"?>
 <p:sld xmlns:a="http://schemas.openxmlformats.org/drawingml/2006/main" xmlns:r="http://schemas.openxmlformats.org/officeDocument/2006/relationships" xmlns:mc="http://schemas.openxmlformats.org/markup-compatibility/2006" xmlns:mv="urn:schemas-microsoft-com:mac:vml" xmlns:p="http://schemas.openxmlformats.org/presentationml/2006/main" xmlns:c="http://schemas.openxmlformats.org/drawingml/2006/chart" xmlns:dgm="http://schemas.openxmlformats.org/drawingml/2006/diagram" xmlns:o="urn:schemas-microsoft-com:office:office" xmlns:v="urn:schemas-microsoft-com:vml" xmlns:pvml="urn:schemas-microsoft-com:office:powerpoint" xmlns:com="http://schemas.openxmlformats.org/drawingml/2006/compatibility" xmlns:p14="http://schemas.microsoft.com/office/powerpoint/2010/main" xmlns:p15="http://schemas.microsoft.com/office/powerpoint/2012/main" xmlns:ahyp="http://schemas.microsoft.com/office/drawing/2018/hyperlinkcolor">
   <p:cSld>
     <p:spTree>
       <p:nvGrpSpPr>
-        <p:cNvPr id="218" name="Shape 218"/>
+        <p:cNvPr id="212" name="Shape 212"/>
         <p:cNvGrpSpPr/>
         <p:nvPr/>
       </p:nvGrpSpPr>
@@ -19494,7 +17188,7 @@
       </p:grpSpPr>
       <p:graphicFrame>
         <p:nvGraphicFramePr>
-          <p:cNvPr id="219" name="Google Shape;219;p15"/>
+          <p:cNvPr id="213" name="Google Shape;213;p15"/>
           <p:cNvGraphicFramePr/>
           <p:nvPr/>
         </p:nvGraphicFramePr>
@@ -19507,7 +17201,7 @@
             <a:tbl>
               <a:tblPr bandRow="1">
                 <a:noFill/>
-                <a:tableStyleId>{84F299B2-7866-4EFB-95E6-AAF9E077ECFF}</a:tableStyleId>
+                <a:tableStyleId>{2E805853-DA08-47E0-B8B1-5B519B90ADBB}</a:tableStyleId>
               </a:tblPr>
               <a:tblGrid>
                 <a:gridCol w="3048000"/>
@@ -19551,7 +17245,7 @@
                           <a:cs typeface="Calibri"/>
                           <a:sym typeface="Calibri"/>
                         </a:rPr>
-                        <a:t>3</a:t>
+                        <a:t>2</a:t>
                       </a:r>
                       <a:endParaRPr sz="2500" u="none" cap="none" strike="noStrike"/>
                     </a:p>
@@ -21656,12 +19350,12 @@
 </p:sld>
 </file>
 
-<file path=ppt/slides/slide18.xml><?xml version="1.0" encoding="utf-8"?>
+<file path=ppt/slides/slide17.xml><?xml version="1.0" encoding="utf-8"?>
 <p:sld xmlns:a="http://schemas.openxmlformats.org/drawingml/2006/main" xmlns:r="http://schemas.openxmlformats.org/officeDocument/2006/relationships" xmlns:mc="http://schemas.openxmlformats.org/markup-compatibility/2006" xmlns:mv="urn:schemas-microsoft-com:mac:vml" xmlns:p="http://schemas.openxmlformats.org/presentationml/2006/main" xmlns:c="http://schemas.openxmlformats.org/drawingml/2006/chart" xmlns:dgm="http://schemas.openxmlformats.org/drawingml/2006/diagram" xmlns:o="urn:schemas-microsoft-com:office:office" xmlns:v="urn:schemas-microsoft-com:vml" xmlns:pvml="urn:schemas-microsoft-com:office:powerpoint" xmlns:com="http://schemas.openxmlformats.org/drawingml/2006/compatibility" xmlns:p14="http://schemas.microsoft.com/office/powerpoint/2010/main" xmlns:p15="http://schemas.microsoft.com/office/powerpoint/2012/main" xmlns:ahyp="http://schemas.microsoft.com/office/drawing/2018/hyperlinkcolor">
   <p:cSld>
     <p:spTree>
       <p:nvGrpSpPr>
-        <p:cNvPr id="224" name="Shape 224"/>
+        <p:cNvPr id="218" name="Shape 218"/>
         <p:cNvGrpSpPr/>
         <p:nvPr/>
       </p:nvGrpSpPr>
@@ -21675,7 +19369,7 @@
       </p:grpSpPr>
       <p:pic>
         <p:nvPicPr>
-          <p:cNvPr descr="A logo of a cell phone&#10;&#10;AI-generated content may be incorrect." id="225" name="Google Shape;225;p17"/>
+          <p:cNvPr descr="A logo of a cell phone&#10;&#10;AI-generated content may be incorrect." id="219" name="Google Shape;219;p17"/>
           <p:cNvPicPr preferRelativeResize="0"/>
           <p:nvPr>
             <p:ph idx="2" type="pic"/>
@@ -21704,7 +19398,7 @@
       </p:pic>
       <p:sp>
         <p:nvSpPr>
-          <p:cNvPr id="226" name="Google Shape;226;p17"/>
+          <p:cNvPr id="220" name="Google Shape;220;p17"/>
           <p:cNvSpPr txBox="1"/>
           <p:nvPr/>
         </p:nvSpPr>
@@ -21768,7 +19462,7 @@
 </p:sld>
 </file>
 
-<file path=ppt/slides/slide19.xml><?xml version="1.0" encoding="utf-8"?>
+<file path=ppt/slides/slide18.xml><?xml version="1.0" encoding="utf-8"?>
 <p:sld xmlns:a="http://schemas.openxmlformats.org/drawingml/2006/main" xmlns:r="http://schemas.openxmlformats.org/officeDocument/2006/relationships" xmlns:mc="http://schemas.openxmlformats.org/markup-compatibility/2006" xmlns:mv="urn:schemas-microsoft-com:mac:vml" xmlns:p="http://schemas.openxmlformats.org/presentationml/2006/main" xmlns:c="http://schemas.openxmlformats.org/drawingml/2006/chart" xmlns:dgm="http://schemas.openxmlformats.org/drawingml/2006/diagram" xmlns:o="urn:schemas-microsoft-com:office:office" xmlns:v="urn:schemas-microsoft-com:vml" xmlns:pvml="urn:schemas-microsoft-com:office:powerpoint" xmlns:com="http://schemas.openxmlformats.org/drawingml/2006/compatibility" xmlns:p14="http://schemas.microsoft.com/office/powerpoint/2010/main" xmlns:p15="http://schemas.microsoft.com/office/powerpoint/2012/main" xmlns:ahyp="http://schemas.microsoft.com/office/drawing/2018/hyperlinkcolor">
   <p:cSld>
     <p:bg>
@@ -21780,7 +19474,7 @@
     </p:bg>
     <p:spTree>
       <p:nvGrpSpPr>
-        <p:cNvPr id="231" name="Shape 231"/>
+        <p:cNvPr id="225" name="Shape 225"/>
         <p:cNvGrpSpPr/>
         <p:nvPr/>
       </p:nvGrpSpPr>
@@ -21794,7 +19488,7 @@
       </p:grpSpPr>
       <p:cxnSp>
         <p:nvCxnSpPr>
-          <p:cNvPr id="232" name="Google Shape;232;p18"/>
+          <p:cNvPr id="226" name="Google Shape;226;p18"/>
           <p:cNvCxnSpPr/>
           <p:nvPr/>
         </p:nvCxnSpPr>
@@ -21822,7 +19516,7 @@
       </p:cxnSp>
       <p:cxnSp>
         <p:nvCxnSpPr>
-          <p:cNvPr id="233" name="Google Shape;233;p18"/>
+          <p:cNvPr id="227" name="Google Shape;227;p18"/>
           <p:cNvCxnSpPr/>
           <p:nvPr/>
         </p:nvCxnSpPr>
@@ -21850,7 +19544,7 @@
       </p:cxnSp>
       <p:cxnSp>
         <p:nvCxnSpPr>
-          <p:cNvPr id="234" name="Google Shape;234;p18"/>
+          <p:cNvPr id="228" name="Google Shape;228;p18"/>
           <p:cNvCxnSpPr/>
           <p:nvPr/>
         </p:nvCxnSpPr>
@@ -21878,7 +19572,7 @@
       </p:cxnSp>
       <p:cxnSp>
         <p:nvCxnSpPr>
-          <p:cNvPr id="235" name="Google Shape;235;p18"/>
+          <p:cNvPr id="229" name="Google Shape;229;p18"/>
           <p:cNvCxnSpPr/>
           <p:nvPr/>
         </p:nvCxnSpPr>
@@ -21906,7 +19600,7 @@
       </p:cxnSp>
       <p:cxnSp>
         <p:nvCxnSpPr>
-          <p:cNvPr id="236" name="Google Shape;236;p18"/>
+          <p:cNvPr id="230" name="Google Shape;230;p18"/>
           <p:cNvCxnSpPr/>
           <p:nvPr/>
         </p:nvCxnSpPr>
@@ -21934,7 +19628,7 @@
       </p:cxnSp>
       <p:cxnSp>
         <p:nvCxnSpPr>
-          <p:cNvPr id="237" name="Google Shape;237;p18"/>
+          <p:cNvPr id="231" name="Google Shape;231;p18"/>
           <p:cNvCxnSpPr/>
           <p:nvPr/>
         </p:nvCxnSpPr>
@@ -21962,7 +19656,7 @@
       </p:cxnSp>
       <p:cxnSp>
         <p:nvCxnSpPr>
-          <p:cNvPr id="238" name="Google Shape;238;p18"/>
+          <p:cNvPr id="232" name="Google Shape;232;p18"/>
           <p:cNvCxnSpPr/>
           <p:nvPr/>
         </p:nvCxnSpPr>
@@ -21990,7 +19684,7 @@
       </p:cxnSp>
       <p:cxnSp>
         <p:nvCxnSpPr>
-          <p:cNvPr id="239" name="Google Shape;239;p18"/>
+          <p:cNvPr id="233" name="Google Shape;233;p18"/>
           <p:cNvCxnSpPr/>
           <p:nvPr/>
         </p:nvCxnSpPr>
@@ -22018,7 +19712,7 @@
       </p:cxnSp>
       <p:sp>
         <p:nvSpPr>
-          <p:cNvPr id="240" name="Google Shape;240;p18"/>
+          <p:cNvPr id="234" name="Google Shape;234;p18"/>
           <p:cNvSpPr txBox="1"/>
           <p:nvPr/>
         </p:nvSpPr>
@@ -22076,7 +19770,7 @@
       </p:sp>
       <p:cxnSp>
         <p:nvCxnSpPr>
-          <p:cNvPr id="241" name="Google Shape;241;p18"/>
+          <p:cNvPr id="235" name="Google Shape;235;p18"/>
           <p:cNvCxnSpPr/>
           <p:nvPr/>
         </p:nvCxnSpPr>
@@ -22104,7 +19798,7 @@
       </p:cxnSp>
       <p:cxnSp>
         <p:nvCxnSpPr>
-          <p:cNvPr id="242" name="Google Shape;242;p18"/>
+          <p:cNvPr id="236" name="Google Shape;236;p18"/>
           <p:cNvCxnSpPr/>
           <p:nvPr/>
         </p:nvCxnSpPr>
@@ -22132,7 +19826,7 @@
       </p:cxnSp>
       <p:cxnSp>
         <p:nvCxnSpPr>
-          <p:cNvPr id="243" name="Google Shape;243;p18"/>
+          <p:cNvPr id="237" name="Google Shape;237;p18"/>
           <p:cNvCxnSpPr/>
           <p:nvPr/>
         </p:nvCxnSpPr>
@@ -22160,7 +19854,7 @@
       </p:cxnSp>
       <p:cxnSp>
         <p:nvCxnSpPr>
-          <p:cNvPr id="244" name="Google Shape;244;p18"/>
+          <p:cNvPr id="238" name="Google Shape;238;p18"/>
           <p:cNvCxnSpPr/>
           <p:nvPr/>
         </p:nvCxnSpPr>
@@ -22188,7 +19882,7 @@
       </p:cxnSp>
       <p:pic>
         <p:nvPicPr>
-          <p:cNvPr descr="A cartoon of a child and child reading a book&#10;&#10;AI-generated content may be incorrect." id="245" name="Google Shape;245;p18"/>
+          <p:cNvPr descr="A cartoon of a child and child reading a book&#10;&#10;AI-generated content may be incorrect." id="239" name="Google Shape;239;p18"/>
           <p:cNvPicPr preferRelativeResize="0"/>
           <p:nvPr/>
         </p:nvPicPr>
@@ -22213,6 +19907,467 @@
           </a:ln>
         </p:spPr>
       </p:pic>
+    </p:spTree>
+  </p:cSld>
+  <p:clrMapOvr>
+    <a:masterClrMapping/>
+  </p:clrMapOvr>
+</p:sld>
+</file>
+
+<file path=ppt/slides/slide19.xml><?xml version="1.0" encoding="utf-8"?>
+<p:sld xmlns:a="http://schemas.openxmlformats.org/drawingml/2006/main" xmlns:r="http://schemas.openxmlformats.org/officeDocument/2006/relationships" xmlns:mc="http://schemas.openxmlformats.org/markup-compatibility/2006" xmlns:mv="urn:schemas-microsoft-com:mac:vml" xmlns:p="http://schemas.openxmlformats.org/presentationml/2006/main" xmlns:c="http://schemas.openxmlformats.org/drawingml/2006/chart" xmlns:dgm="http://schemas.openxmlformats.org/drawingml/2006/diagram" xmlns:o="urn:schemas-microsoft-com:office:office" xmlns:v="urn:schemas-microsoft-com:vml" xmlns:pvml="urn:schemas-microsoft-com:office:powerpoint" xmlns:com="http://schemas.openxmlformats.org/drawingml/2006/compatibility" xmlns:p14="http://schemas.microsoft.com/office/powerpoint/2010/main" xmlns:p15="http://schemas.microsoft.com/office/powerpoint/2012/main" xmlns:ahyp="http://schemas.microsoft.com/office/drawing/2018/hyperlinkcolor">
+  <p:cSld>
+    <p:bg>
+      <p:bgPr>
+        <a:solidFill>
+          <a:srgbClr val="FFFFFF"/>
+        </a:solidFill>
+      </p:bgPr>
+    </p:bg>
+    <p:spTree>
+      <p:nvGrpSpPr>
+        <p:cNvPr id="244" name="Shape 244"/>
+        <p:cNvGrpSpPr/>
+        <p:nvPr/>
+      </p:nvGrpSpPr>
+      <p:grpSpPr>
+        <a:xfrm>
+          <a:off x="0" y="0"/>
+          <a:ext cx="0" cy="0"/>
+          <a:chOff x="0" y="0"/>
+          <a:chExt cx="0" cy="0"/>
+        </a:xfrm>
+      </p:grpSpPr>
+      <p:cxnSp>
+        <p:nvCxnSpPr>
+          <p:cNvPr id="245" name="Google Shape;245;p19"/>
+          <p:cNvCxnSpPr/>
+          <p:nvPr/>
+        </p:nvCxnSpPr>
+        <p:spPr>
+          <a:xfrm flipH="1">
+            <a:off x="0" y="0"/>
+            <a:ext cx="3119722" cy="685800"/>
+          </a:xfrm>
+          <a:prstGeom prst="straightConnector1">
+            <a:avLst/>
+          </a:prstGeom>
+          <a:noFill/>
+          <a:ln cap="flat" cmpd="sng" w="12700">
+            <a:solidFill>
+              <a:srgbClr val="BA9CA0">
+                <a:alpha val="69803"/>
+              </a:srgbClr>
+            </a:solidFill>
+            <a:prstDash val="solid"/>
+            <a:miter lim="8000"/>
+            <a:headEnd len="sm" w="sm" type="none"/>
+            <a:tailEnd len="sm" w="sm" type="none"/>
+          </a:ln>
+        </p:spPr>
+      </p:cxnSp>
+      <p:cxnSp>
+        <p:nvCxnSpPr>
+          <p:cNvPr id="246" name="Google Shape;246;p19"/>
+          <p:cNvCxnSpPr/>
+          <p:nvPr/>
+        </p:nvCxnSpPr>
+        <p:spPr>
+          <a:xfrm flipH="1">
+            <a:off x="0" y="0"/>
+            <a:ext cx="903765" cy="6543675"/>
+          </a:xfrm>
+          <a:prstGeom prst="straightConnector1">
+            <a:avLst/>
+          </a:prstGeom>
+          <a:noFill/>
+          <a:ln cap="flat" cmpd="sng" w="12700">
+            <a:solidFill>
+              <a:srgbClr val="BA9CA0">
+                <a:alpha val="69803"/>
+              </a:srgbClr>
+            </a:solidFill>
+            <a:prstDash val="solid"/>
+            <a:miter lim="8000"/>
+            <a:headEnd len="sm" w="sm" type="none"/>
+            <a:tailEnd len="sm" w="sm" type="none"/>
+          </a:ln>
+        </p:spPr>
+      </p:cxnSp>
+      <p:cxnSp>
+        <p:nvCxnSpPr>
+          <p:cNvPr id="247" name="Google Shape;247;p19"/>
+          <p:cNvCxnSpPr/>
+          <p:nvPr/>
+        </p:nvCxnSpPr>
+        <p:spPr>
+          <a:xfrm rot="10800000">
+            <a:off x="-42867" y="5791196"/>
+            <a:ext cx="6286509" cy="1066804"/>
+          </a:xfrm>
+          <a:prstGeom prst="straightConnector1">
+            <a:avLst/>
+          </a:prstGeom>
+          <a:noFill/>
+          <a:ln cap="flat" cmpd="sng" w="12700">
+            <a:solidFill>
+              <a:srgbClr val="BA9CA0">
+                <a:alpha val="69803"/>
+              </a:srgbClr>
+            </a:solidFill>
+            <a:prstDash val="solid"/>
+            <a:miter lim="8000"/>
+            <a:headEnd len="sm" w="sm" type="none"/>
+            <a:tailEnd len="sm" w="sm" type="none"/>
+          </a:ln>
+        </p:spPr>
+      </p:cxnSp>
+      <p:cxnSp>
+        <p:nvCxnSpPr>
+          <p:cNvPr id="248" name="Google Shape;248;p19"/>
+          <p:cNvCxnSpPr/>
+          <p:nvPr/>
+        </p:nvCxnSpPr>
+        <p:spPr>
+          <a:xfrm flipH="1">
+            <a:off x="8462964" y="5848346"/>
+            <a:ext cx="3729032" cy="1009654"/>
+          </a:xfrm>
+          <a:prstGeom prst="straightConnector1">
+            <a:avLst/>
+          </a:prstGeom>
+          <a:noFill/>
+          <a:ln cap="flat" cmpd="sng" w="12700">
+            <a:solidFill>
+              <a:srgbClr val="BA9CA0">
+                <a:alpha val="69803"/>
+              </a:srgbClr>
+            </a:solidFill>
+            <a:prstDash val="solid"/>
+            <a:miter lim="8000"/>
+            <a:headEnd len="sm" w="sm" type="none"/>
+            <a:tailEnd len="sm" w="sm" type="none"/>
+          </a:ln>
+        </p:spPr>
+      </p:cxnSp>
+      <p:cxnSp>
+        <p:nvCxnSpPr>
+          <p:cNvPr id="249" name="Google Shape;249;p19"/>
+          <p:cNvCxnSpPr/>
+          <p:nvPr/>
+        </p:nvCxnSpPr>
+        <p:spPr>
+          <a:xfrm flipH="1">
+            <a:off x="11543157" y="1647821"/>
+            <a:ext cx="648839" cy="5210179"/>
+          </a:xfrm>
+          <a:prstGeom prst="straightConnector1">
+            <a:avLst/>
+          </a:prstGeom>
+          <a:noFill/>
+          <a:ln cap="flat" cmpd="sng" w="12700">
+            <a:solidFill>
+              <a:srgbClr val="BA9CA0">
+                <a:alpha val="69803"/>
+              </a:srgbClr>
+            </a:solidFill>
+            <a:prstDash val="solid"/>
+            <a:miter lim="8000"/>
+            <a:headEnd len="sm" w="sm" type="none"/>
+            <a:tailEnd len="sm" w="sm" type="none"/>
+          </a:ln>
+        </p:spPr>
+      </p:cxnSp>
+      <p:cxnSp>
+        <p:nvCxnSpPr>
+          <p:cNvPr id="250" name="Google Shape;250;p19"/>
+          <p:cNvCxnSpPr/>
+          <p:nvPr/>
+        </p:nvCxnSpPr>
+        <p:spPr>
+          <a:xfrm rot="10800000">
+            <a:off x="10781553" y="0"/>
+            <a:ext cx="1410443" cy="4258342"/>
+          </a:xfrm>
+          <a:prstGeom prst="straightConnector1">
+            <a:avLst/>
+          </a:prstGeom>
+          <a:noFill/>
+          <a:ln cap="flat" cmpd="sng" w="12700">
+            <a:solidFill>
+              <a:srgbClr val="BA9CA0">
+                <a:alpha val="69803"/>
+              </a:srgbClr>
+            </a:solidFill>
+            <a:prstDash val="solid"/>
+            <a:miter lim="8000"/>
+            <a:headEnd len="sm" w="sm" type="none"/>
+            <a:tailEnd len="sm" w="sm" type="none"/>
+          </a:ln>
+        </p:spPr>
+      </p:cxnSp>
+      <p:cxnSp>
+        <p:nvCxnSpPr>
+          <p:cNvPr id="251" name="Google Shape;251;p19"/>
+          <p:cNvCxnSpPr/>
+          <p:nvPr/>
+        </p:nvCxnSpPr>
+        <p:spPr>
+          <a:xfrm rot="10800000">
+            <a:off x="6529392" y="-4764"/>
+            <a:ext cx="5662604" cy="931974"/>
+          </a:xfrm>
+          <a:prstGeom prst="straightConnector1">
+            <a:avLst/>
+          </a:prstGeom>
+          <a:noFill/>
+          <a:ln cap="flat" cmpd="sng" w="12700">
+            <a:solidFill>
+              <a:srgbClr val="BA9CA0">
+                <a:alpha val="69803"/>
+              </a:srgbClr>
+            </a:solidFill>
+            <a:prstDash val="solid"/>
+            <a:miter lim="8000"/>
+            <a:headEnd len="sm" w="sm" type="none"/>
+            <a:tailEnd len="sm" w="sm" type="none"/>
+          </a:ln>
+        </p:spPr>
+      </p:cxnSp>
+      <p:cxnSp>
+        <p:nvCxnSpPr>
+          <p:cNvPr id="252" name="Google Shape;252;p19"/>
+          <p:cNvCxnSpPr/>
+          <p:nvPr/>
+        </p:nvCxnSpPr>
+        <p:spPr>
+          <a:xfrm flipH="1">
+            <a:off x="0" y="0"/>
+            <a:ext cx="7289971" cy="1338946"/>
+          </a:xfrm>
+          <a:prstGeom prst="straightConnector1">
+            <a:avLst/>
+          </a:prstGeom>
+          <a:noFill/>
+          <a:ln cap="flat" cmpd="sng" w="12700">
+            <a:solidFill>
+              <a:srgbClr val="BA9CA0">
+                <a:alpha val="69803"/>
+              </a:srgbClr>
+            </a:solidFill>
+            <a:prstDash val="solid"/>
+            <a:miter lim="8000"/>
+            <a:headEnd len="sm" w="sm" type="none"/>
+            <a:tailEnd len="sm" w="sm" type="none"/>
+          </a:ln>
+        </p:spPr>
+      </p:cxnSp>
+      <p:cxnSp>
+        <p:nvCxnSpPr>
+          <p:cNvPr id="253" name="Google Shape;253;p19"/>
+          <p:cNvCxnSpPr/>
+          <p:nvPr/>
+        </p:nvCxnSpPr>
+        <p:spPr>
+          <a:xfrm flipH="1">
+            <a:off x="660992" y="0"/>
+            <a:ext cx="863011" cy="4850297"/>
+          </a:xfrm>
+          <a:prstGeom prst="straightConnector1">
+            <a:avLst/>
+          </a:prstGeom>
+          <a:noFill/>
+          <a:ln cap="flat" cmpd="sng" w="12700">
+            <a:solidFill>
+              <a:srgbClr val="BA9CA0">
+                <a:alpha val="69803"/>
+              </a:srgbClr>
+            </a:solidFill>
+            <a:prstDash val="solid"/>
+            <a:miter lim="8000"/>
+            <a:headEnd len="sm" w="sm" type="none"/>
+            <a:tailEnd len="sm" w="sm" type="none"/>
+          </a:ln>
+        </p:spPr>
+      </p:cxnSp>
+      <p:cxnSp>
+        <p:nvCxnSpPr>
+          <p:cNvPr id="254" name="Google Shape;254;p19"/>
+          <p:cNvCxnSpPr/>
+          <p:nvPr/>
+        </p:nvCxnSpPr>
+        <p:spPr>
+          <a:xfrm>
+            <a:off x="0" y="3632371"/>
+            <a:ext cx="3875309" cy="1195478"/>
+          </a:xfrm>
+          <a:prstGeom prst="straightConnector1">
+            <a:avLst/>
+          </a:prstGeom>
+          <a:noFill/>
+          <a:ln cap="flat" cmpd="sng" w="12700">
+            <a:solidFill>
+              <a:srgbClr val="BA9CA0">
+                <a:alpha val="69803"/>
+              </a:srgbClr>
+            </a:solidFill>
+            <a:prstDash val="solid"/>
+            <a:miter lim="8000"/>
+            <a:headEnd len="sm" w="sm" type="none"/>
+            <a:tailEnd len="sm" w="sm" type="none"/>
+          </a:ln>
+        </p:spPr>
+      </p:cxnSp>
+      <p:cxnSp>
+        <p:nvCxnSpPr>
+          <p:cNvPr id="255" name="Google Shape;255;p19"/>
+          <p:cNvCxnSpPr/>
+          <p:nvPr/>
+        </p:nvCxnSpPr>
+        <p:spPr>
+          <a:xfrm flipH="1">
+            <a:off x="10763621" y="1392868"/>
+            <a:ext cx="1428375" cy="3457429"/>
+          </a:xfrm>
+          <a:prstGeom prst="straightConnector1">
+            <a:avLst/>
+          </a:prstGeom>
+          <a:noFill/>
+          <a:ln cap="flat" cmpd="sng" w="12700">
+            <a:solidFill>
+              <a:srgbClr val="BA9CA0">
+                <a:alpha val="69803"/>
+              </a:srgbClr>
+            </a:solidFill>
+            <a:prstDash val="solid"/>
+            <a:miter lim="8000"/>
+            <a:headEnd len="sm" w="sm" type="none"/>
+            <a:tailEnd len="sm" w="sm" type="none"/>
+          </a:ln>
+        </p:spPr>
+      </p:cxnSp>
+      <p:cxnSp>
+        <p:nvCxnSpPr>
+          <p:cNvPr id="256" name="Google Shape;256;p19"/>
+          <p:cNvCxnSpPr/>
+          <p:nvPr/>
+        </p:nvCxnSpPr>
+        <p:spPr>
+          <a:xfrm rot="10800000">
+            <a:off x="10367403" y="0"/>
+            <a:ext cx="1824593" cy="4338919"/>
+          </a:xfrm>
+          <a:prstGeom prst="straightConnector1">
+            <a:avLst/>
+          </a:prstGeom>
+          <a:noFill/>
+          <a:ln cap="flat" cmpd="sng" w="12700">
+            <a:solidFill>
+              <a:srgbClr val="BA9CA0">
+                <a:alpha val="69803"/>
+              </a:srgbClr>
+            </a:solidFill>
+            <a:prstDash val="solid"/>
+            <a:miter lim="8000"/>
+            <a:headEnd len="sm" w="sm" type="none"/>
+            <a:tailEnd len="sm" w="sm" type="none"/>
+          </a:ln>
+        </p:spPr>
+      </p:cxnSp>
+      <p:pic>
+        <p:nvPicPr>
+          <p:cNvPr id="257" name="Google Shape;257;p19"/>
+          <p:cNvPicPr preferRelativeResize="0"/>
+          <p:nvPr/>
+        </p:nvPicPr>
+        <p:blipFill rotWithShape="1">
+          <a:blip r:embed="rId3">
+            <a:alphaModFix/>
+          </a:blip>
+          <a:srcRect b="0" l="0" r="0" t="0"/>
+          <a:stretch/>
+        </p:blipFill>
+        <p:spPr>
+          <a:xfrm>
+            <a:off x="2758678" y="1007266"/>
+            <a:ext cx="7286444" cy="5247731"/>
+          </a:xfrm>
+          <a:prstGeom prst="rect">
+            <a:avLst/>
+          </a:prstGeom>
+          <a:noFill/>
+          <a:ln>
+            <a:noFill/>
+          </a:ln>
+        </p:spPr>
+      </p:pic>
+      <p:sp>
+        <p:nvSpPr>
+          <p:cNvPr id="258" name="Google Shape;258;p19"/>
+          <p:cNvSpPr txBox="1"/>
+          <p:nvPr/>
+        </p:nvSpPr>
+        <p:spPr>
+          <a:xfrm>
+            <a:off x="1350440" y="331854"/>
+            <a:ext cx="10102922" cy="675421"/>
+          </a:xfrm>
+          <a:prstGeom prst="rect">
+            <a:avLst/>
+          </a:prstGeom>
+          <a:noFill/>
+          <a:ln>
+            <a:noFill/>
+          </a:ln>
+        </p:spPr>
+        <p:txBody>
+          <a:bodyPr anchorCtr="1" anchor="b" bIns="45700" lIns="91425" spcFirstLastPara="1" rIns="91425" wrap="square" tIns="45700">
+            <a:normAutofit/>
+          </a:bodyPr>
+          <a:lstStyle/>
+          <a:p>
+            <a:pPr indent="0" lvl="0" marL="0" marR="0" rtl="0" algn="ctr">
+              <a:lnSpc>
+                <a:spcPct val="90000"/>
+              </a:lnSpc>
+              <a:spcBef>
+                <a:spcPts val="0"/>
+              </a:spcBef>
+              <a:spcAft>
+                <a:spcPts val="0"/>
+              </a:spcAft>
+              <a:buClr>
+                <a:schemeClr val="lt1"/>
+              </a:buClr>
+              <a:buSzPts val="4000"/>
+              <a:buFont typeface="Open Sans Light"/>
+              <a:buNone/>
+            </a:pPr>
+            <a:r>
+              <a:rPr b="0" i="0" lang="ar-AE" sz="4000" u="none" cap="none" strike="noStrike">
+                <a:solidFill>
+                  <a:schemeClr val="lt1"/>
+                </a:solidFill>
+                <a:latin typeface="Open Sans Light"/>
+                <a:ea typeface="Open Sans Light"/>
+                <a:cs typeface="Open Sans Light"/>
+                <a:sym typeface="Open Sans Light"/>
+              </a:rPr>
+              <a:t>COLOURS</a:t>
+            </a:r>
+            <a:endParaRPr b="0" i="0" sz="1800" u="none" cap="none" strike="noStrike">
+              <a:solidFill>
+                <a:schemeClr val="lt1"/>
+              </a:solidFill>
+              <a:latin typeface="Open Sans Light"/>
+              <a:ea typeface="Open Sans Light"/>
+              <a:cs typeface="Open Sans Light"/>
+              <a:sym typeface="Open Sans Light"/>
+            </a:endParaRPr>
+          </a:p>
+        </p:txBody>
+      </p:sp>
     </p:spTree>
   </p:cSld>
   <p:clrMapOvr>
@@ -22444,8 +20599,8 @@
         </p:nvSpPr>
         <p:spPr>
           <a:xfrm>
-            <a:off x="7728152" y="1489109"/>
-            <a:ext cx="3234818" cy="2824042"/>
+            <a:off x="7728115" y="1489184"/>
+            <a:ext cx="3234900" cy="2823900"/>
           </a:xfrm>
           <a:prstGeom prst="rect">
             <a:avLst/>
@@ -22573,7 +20728,7 @@
         </p:nvSpPr>
         <p:spPr>
           <a:xfrm>
-            <a:off x="1251197" y="850514"/>
+            <a:off x="3965822" y="1450814"/>
             <a:ext cx="3495300" cy="600300"/>
           </a:xfrm>
           <a:prstGeom prst="rect">
@@ -22639,7 +20794,7 @@
         </p:nvSpPr>
         <p:spPr>
           <a:xfrm>
-            <a:off x="7728115" y="850518"/>
+            <a:off x="5888614" y="493343"/>
             <a:ext cx="3234900" cy="600300"/>
           </a:xfrm>
           <a:prstGeom prst="rect">
@@ -22705,7 +20860,7 @@
         </p:nvSpPr>
         <p:spPr>
           <a:xfrm>
-            <a:off x="1079100" y="1394813"/>
+            <a:off x="4960500" y="1335900"/>
             <a:ext cx="3667500" cy="3012600"/>
           </a:xfrm>
           <a:prstGeom prst="rect">
@@ -22780,7 +20935,7 @@
     </p:bg>
     <p:spTree>
       <p:nvGrpSpPr>
-        <p:cNvPr id="250" name="Shape 250"/>
+        <p:cNvPr id="263" name="Shape 263"/>
         <p:cNvGrpSpPr/>
         <p:nvPr/>
       </p:nvGrpSpPr>
@@ -22794,7 +20949,7 @@
       </p:grpSpPr>
       <p:cxnSp>
         <p:nvCxnSpPr>
-          <p:cNvPr id="251" name="Google Shape;251;p19"/>
+          <p:cNvPr id="264" name="Google Shape;264;p20"/>
           <p:cNvCxnSpPr/>
           <p:nvPr/>
         </p:nvCxnSpPr>
@@ -22822,7 +20977,7 @@
       </p:cxnSp>
       <p:cxnSp>
         <p:nvCxnSpPr>
-          <p:cNvPr id="252" name="Google Shape;252;p19"/>
+          <p:cNvPr id="265" name="Google Shape;265;p20"/>
           <p:cNvCxnSpPr/>
           <p:nvPr/>
         </p:nvCxnSpPr>
@@ -22850,7 +21005,7 @@
       </p:cxnSp>
       <p:cxnSp>
         <p:nvCxnSpPr>
-          <p:cNvPr id="253" name="Google Shape;253;p19"/>
+          <p:cNvPr id="266" name="Google Shape;266;p20"/>
           <p:cNvCxnSpPr/>
           <p:nvPr/>
         </p:nvCxnSpPr>
@@ -22878,7 +21033,7 @@
       </p:cxnSp>
       <p:cxnSp>
         <p:nvCxnSpPr>
-          <p:cNvPr id="254" name="Google Shape;254;p19"/>
+          <p:cNvPr id="267" name="Google Shape;267;p20"/>
           <p:cNvCxnSpPr/>
           <p:nvPr/>
         </p:nvCxnSpPr>
@@ -22906,7 +21061,7 @@
       </p:cxnSp>
       <p:cxnSp>
         <p:nvCxnSpPr>
-          <p:cNvPr id="255" name="Google Shape;255;p19"/>
+          <p:cNvPr id="268" name="Google Shape;268;p20"/>
           <p:cNvCxnSpPr/>
           <p:nvPr/>
         </p:nvCxnSpPr>
@@ -22934,7 +21089,7 @@
       </p:cxnSp>
       <p:cxnSp>
         <p:nvCxnSpPr>
-          <p:cNvPr id="256" name="Google Shape;256;p19"/>
+          <p:cNvPr id="269" name="Google Shape;269;p20"/>
           <p:cNvCxnSpPr/>
           <p:nvPr/>
         </p:nvCxnSpPr>
@@ -22962,7 +21117,7 @@
       </p:cxnSp>
       <p:cxnSp>
         <p:nvCxnSpPr>
-          <p:cNvPr id="257" name="Google Shape;257;p19"/>
+          <p:cNvPr id="270" name="Google Shape;270;p20"/>
           <p:cNvCxnSpPr/>
           <p:nvPr/>
         </p:nvCxnSpPr>
@@ -22990,7 +21145,7 @@
       </p:cxnSp>
       <p:cxnSp>
         <p:nvCxnSpPr>
-          <p:cNvPr id="258" name="Google Shape;258;p19"/>
+          <p:cNvPr id="271" name="Google Shape;271;p20"/>
           <p:cNvCxnSpPr/>
           <p:nvPr/>
         </p:nvCxnSpPr>
@@ -23018,7 +21173,7 @@
       </p:cxnSp>
       <p:cxnSp>
         <p:nvCxnSpPr>
-          <p:cNvPr id="259" name="Google Shape;259;p19"/>
+          <p:cNvPr id="272" name="Google Shape;272;p20"/>
           <p:cNvCxnSpPr/>
           <p:nvPr/>
         </p:nvCxnSpPr>
@@ -23046,7 +21201,7 @@
       </p:cxnSp>
       <p:cxnSp>
         <p:nvCxnSpPr>
-          <p:cNvPr id="260" name="Google Shape;260;p19"/>
+          <p:cNvPr id="273" name="Google Shape;273;p20"/>
           <p:cNvCxnSpPr/>
           <p:nvPr/>
         </p:nvCxnSpPr>
@@ -23074,7 +21229,7 @@
       </p:cxnSp>
       <p:cxnSp>
         <p:nvCxnSpPr>
-          <p:cNvPr id="261" name="Google Shape;261;p19"/>
+          <p:cNvPr id="274" name="Google Shape;274;p20"/>
           <p:cNvCxnSpPr/>
           <p:nvPr/>
         </p:nvCxnSpPr>
@@ -23102,468 +21257,7 @@
       </p:cxnSp>
       <p:cxnSp>
         <p:nvCxnSpPr>
-          <p:cNvPr id="262" name="Google Shape;262;p19"/>
-          <p:cNvCxnSpPr/>
-          <p:nvPr/>
-        </p:nvCxnSpPr>
-        <p:spPr>
-          <a:xfrm rot="10800000">
-            <a:off x="10367403" y="0"/>
-            <a:ext cx="1824593" cy="4338919"/>
-          </a:xfrm>
-          <a:prstGeom prst="straightConnector1">
-            <a:avLst/>
-          </a:prstGeom>
-          <a:noFill/>
-          <a:ln cap="flat" cmpd="sng" w="12700">
-            <a:solidFill>
-              <a:srgbClr val="BA9CA0">
-                <a:alpha val="69803"/>
-              </a:srgbClr>
-            </a:solidFill>
-            <a:prstDash val="solid"/>
-            <a:miter lim="8000"/>
-            <a:headEnd len="sm" w="sm" type="none"/>
-            <a:tailEnd len="sm" w="sm" type="none"/>
-          </a:ln>
-        </p:spPr>
-      </p:cxnSp>
-      <p:pic>
-        <p:nvPicPr>
-          <p:cNvPr id="263" name="Google Shape;263;p19"/>
-          <p:cNvPicPr preferRelativeResize="0"/>
-          <p:nvPr/>
-        </p:nvPicPr>
-        <p:blipFill rotWithShape="1">
-          <a:blip r:embed="rId3">
-            <a:alphaModFix/>
-          </a:blip>
-          <a:srcRect b="0" l="0" r="0" t="0"/>
-          <a:stretch/>
-        </p:blipFill>
-        <p:spPr>
-          <a:xfrm>
-            <a:off x="2758678" y="1007266"/>
-            <a:ext cx="7286444" cy="5247731"/>
-          </a:xfrm>
-          <a:prstGeom prst="rect">
-            <a:avLst/>
-          </a:prstGeom>
-          <a:noFill/>
-          <a:ln>
-            <a:noFill/>
-          </a:ln>
-        </p:spPr>
-      </p:pic>
-      <p:sp>
-        <p:nvSpPr>
-          <p:cNvPr id="264" name="Google Shape;264;p19"/>
-          <p:cNvSpPr txBox="1"/>
-          <p:nvPr/>
-        </p:nvSpPr>
-        <p:spPr>
-          <a:xfrm>
-            <a:off x="1350440" y="331854"/>
-            <a:ext cx="10102922" cy="675421"/>
-          </a:xfrm>
-          <a:prstGeom prst="rect">
-            <a:avLst/>
-          </a:prstGeom>
-          <a:noFill/>
-          <a:ln>
-            <a:noFill/>
-          </a:ln>
-        </p:spPr>
-        <p:txBody>
-          <a:bodyPr anchorCtr="1" anchor="b" bIns="45700" lIns="91425" spcFirstLastPara="1" rIns="91425" wrap="square" tIns="45700">
-            <a:normAutofit/>
-          </a:bodyPr>
-          <a:lstStyle/>
-          <a:p>
-            <a:pPr indent="0" lvl="0" marL="0" marR="0" rtl="0" algn="ctr">
-              <a:lnSpc>
-                <a:spcPct val="90000"/>
-              </a:lnSpc>
-              <a:spcBef>
-                <a:spcPts val="0"/>
-              </a:spcBef>
-              <a:spcAft>
-                <a:spcPts val="0"/>
-              </a:spcAft>
-              <a:buClr>
-                <a:schemeClr val="lt1"/>
-              </a:buClr>
-              <a:buSzPts val="4000"/>
-              <a:buFont typeface="Open Sans Light"/>
-              <a:buNone/>
-            </a:pPr>
-            <a:r>
-              <a:rPr b="0" i="0" lang="ar-AE" sz="4000" u="none" cap="none" strike="noStrike">
-                <a:solidFill>
-                  <a:schemeClr val="lt1"/>
-                </a:solidFill>
-                <a:latin typeface="Open Sans Light"/>
-                <a:ea typeface="Open Sans Light"/>
-                <a:cs typeface="Open Sans Light"/>
-                <a:sym typeface="Open Sans Light"/>
-              </a:rPr>
-              <a:t>COLOURS</a:t>
-            </a:r>
-            <a:endParaRPr b="0" i="0" sz="1800" u="none" cap="none" strike="noStrike">
-              <a:solidFill>
-                <a:schemeClr val="lt1"/>
-              </a:solidFill>
-              <a:latin typeface="Open Sans Light"/>
-              <a:ea typeface="Open Sans Light"/>
-              <a:cs typeface="Open Sans Light"/>
-              <a:sym typeface="Open Sans Light"/>
-            </a:endParaRPr>
-          </a:p>
-        </p:txBody>
-      </p:sp>
-    </p:spTree>
-  </p:cSld>
-  <p:clrMapOvr>
-    <a:masterClrMapping/>
-  </p:clrMapOvr>
-</p:sld>
-</file>
-
-<file path=ppt/slides/slide21.xml><?xml version="1.0" encoding="utf-8"?>
-<p:sld xmlns:a="http://schemas.openxmlformats.org/drawingml/2006/main" xmlns:r="http://schemas.openxmlformats.org/officeDocument/2006/relationships" xmlns:mc="http://schemas.openxmlformats.org/markup-compatibility/2006" xmlns:mv="urn:schemas-microsoft-com:mac:vml" xmlns:p="http://schemas.openxmlformats.org/presentationml/2006/main" xmlns:c="http://schemas.openxmlformats.org/drawingml/2006/chart" xmlns:dgm="http://schemas.openxmlformats.org/drawingml/2006/diagram" xmlns:o="urn:schemas-microsoft-com:office:office" xmlns:v="urn:schemas-microsoft-com:vml" xmlns:pvml="urn:schemas-microsoft-com:office:powerpoint" xmlns:com="http://schemas.openxmlformats.org/drawingml/2006/compatibility" xmlns:p14="http://schemas.microsoft.com/office/powerpoint/2010/main" xmlns:p15="http://schemas.microsoft.com/office/powerpoint/2012/main" xmlns:ahyp="http://schemas.microsoft.com/office/drawing/2018/hyperlinkcolor">
-  <p:cSld>
-    <p:bg>
-      <p:bgPr>
-        <a:solidFill>
-          <a:srgbClr val="FFFFFF"/>
-        </a:solidFill>
-      </p:bgPr>
-    </p:bg>
-    <p:spTree>
-      <p:nvGrpSpPr>
-        <p:cNvPr id="269" name="Shape 269"/>
-        <p:cNvGrpSpPr/>
-        <p:nvPr/>
-      </p:nvGrpSpPr>
-      <p:grpSpPr>
-        <a:xfrm>
-          <a:off x="0" y="0"/>
-          <a:ext cx="0" cy="0"/>
-          <a:chOff x="0" y="0"/>
-          <a:chExt cx="0" cy="0"/>
-        </a:xfrm>
-      </p:grpSpPr>
-      <p:cxnSp>
-        <p:nvCxnSpPr>
-          <p:cNvPr id="270" name="Google Shape;270;p20"/>
-          <p:cNvCxnSpPr/>
-          <p:nvPr/>
-        </p:nvCxnSpPr>
-        <p:spPr>
-          <a:xfrm flipH="1">
-            <a:off x="0" y="0"/>
-            <a:ext cx="3119722" cy="685800"/>
-          </a:xfrm>
-          <a:prstGeom prst="straightConnector1">
-            <a:avLst/>
-          </a:prstGeom>
-          <a:noFill/>
-          <a:ln cap="flat" cmpd="sng" w="12700">
-            <a:solidFill>
-              <a:srgbClr val="BA9CA0">
-                <a:alpha val="69803"/>
-              </a:srgbClr>
-            </a:solidFill>
-            <a:prstDash val="solid"/>
-            <a:miter lim="8000"/>
-            <a:headEnd len="sm" w="sm" type="none"/>
-            <a:tailEnd len="sm" w="sm" type="none"/>
-          </a:ln>
-        </p:spPr>
-      </p:cxnSp>
-      <p:cxnSp>
-        <p:nvCxnSpPr>
-          <p:cNvPr id="271" name="Google Shape;271;p20"/>
-          <p:cNvCxnSpPr/>
-          <p:nvPr/>
-        </p:nvCxnSpPr>
-        <p:spPr>
-          <a:xfrm flipH="1">
-            <a:off x="0" y="0"/>
-            <a:ext cx="903765" cy="6543675"/>
-          </a:xfrm>
-          <a:prstGeom prst="straightConnector1">
-            <a:avLst/>
-          </a:prstGeom>
-          <a:noFill/>
-          <a:ln cap="flat" cmpd="sng" w="12700">
-            <a:solidFill>
-              <a:srgbClr val="BA9CA0">
-                <a:alpha val="69803"/>
-              </a:srgbClr>
-            </a:solidFill>
-            <a:prstDash val="solid"/>
-            <a:miter lim="8000"/>
-            <a:headEnd len="sm" w="sm" type="none"/>
-            <a:tailEnd len="sm" w="sm" type="none"/>
-          </a:ln>
-        </p:spPr>
-      </p:cxnSp>
-      <p:cxnSp>
-        <p:nvCxnSpPr>
-          <p:cNvPr id="272" name="Google Shape;272;p20"/>
-          <p:cNvCxnSpPr/>
-          <p:nvPr/>
-        </p:nvCxnSpPr>
-        <p:spPr>
-          <a:xfrm rot="10800000">
-            <a:off x="-42867" y="5791196"/>
-            <a:ext cx="6286509" cy="1066804"/>
-          </a:xfrm>
-          <a:prstGeom prst="straightConnector1">
-            <a:avLst/>
-          </a:prstGeom>
-          <a:noFill/>
-          <a:ln cap="flat" cmpd="sng" w="12700">
-            <a:solidFill>
-              <a:srgbClr val="BA9CA0">
-                <a:alpha val="69803"/>
-              </a:srgbClr>
-            </a:solidFill>
-            <a:prstDash val="solid"/>
-            <a:miter lim="8000"/>
-            <a:headEnd len="sm" w="sm" type="none"/>
-            <a:tailEnd len="sm" w="sm" type="none"/>
-          </a:ln>
-        </p:spPr>
-      </p:cxnSp>
-      <p:cxnSp>
-        <p:nvCxnSpPr>
-          <p:cNvPr id="273" name="Google Shape;273;p20"/>
-          <p:cNvCxnSpPr/>
-          <p:nvPr/>
-        </p:nvCxnSpPr>
-        <p:spPr>
-          <a:xfrm flipH="1">
-            <a:off x="8462964" y="5848346"/>
-            <a:ext cx="3729032" cy="1009654"/>
-          </a:xfrm>
-          <a:prstGeom prst="straightConnector1">
-            <a:avLst/>
-          </a:prstGeom>
-          <a:noFill/>
-          <a:ln cap="flat" cmpd="sng" w="12700">
-            <a:solidFill>
-              <a:srgbClr val="BA9CA0">
-                <a:alpha val="69803"/>
-              </a:srgbClr>
-            </a:solidFill>
-            <a:prstDash val="solid"/>
-            <a:miter lim="8000"/>
-            <a:headEnd len="sm" w="sm" type="none"/>
-            <a:tailEnd len="sm" w="sm" type="none"/>
-          </a:ln>
-        </p:spPr>
-      </p:cxnSp>
-      <p:cxnSp>
-        <p:nvCxnSpPr>
-          <p:cNvPr id="274" name="Google Shape;274;p20"/>
-          <p:cNvCxnSpPr/>
-          <p:nvPr/>
-        </p:nvCxnSpPr>
-        <p:spPr>
-          <a:xfrm flipH="1">
-            <a:off x="11543157" y="1647821"/>
-            <a:ext cx="648839" cy="5210179"/>
-          </a:xfrm>
-          <a:prstGeom prst="straightConnector1">
-            <a:avLst/>
-          </a:prstGeom>
-          <a:noFill/>
-          <a:ln cap="flat" cmpd="sng" w="12700">
-            <a:solidFill>
-              <a:srgbClr val="BA9CA0">
-                <a:alpha val="69803"/>
-              </a:srgbClr>
-            </a:solidFill>
-            <a:prstDash val="solid"/>
-            <a:miter lim="8000"/>
-            <a:headEnd len="sm" w="sm" type="none"/>
-            <a:tailEnd len="sm" w="sm" type="none"/>
-          </a:ln>
-        </p:spPr>
-      </p:cxnSp>
-      <p:cxnSp>
-        <p:nvCxnSpPr>
           <p:cNvPr id="275" name="Google Shape;275;p20"/>
-          <p:cNvCxnSpPr/>
-          <p:nvPr/>
-        </p:nvCxnSpPr>
-        <p:spPr>
-          <a:xfrm rot="10800000">
-            <a:off x="10781553" y="0"/>
-            <a:ext cx="1410443" cy="4258342"/>
-          </a:xfrm>
-          <a:prstGeom prst="straightConnector1">
-            <a:avLst/>
-          </a:prstGeom>
-          <a:noFill/>
-          <a:ln cap="flat" cmpd="sng" w="12700">
-            <a:solidFill>
-              <a:srgbClr val="BA9CA0">
-                <a:alpha val="69803"/>
-              </a:srgbClr>
-            </a:solidFill>
-            <a:prstDash val="solid"/>
-            <a:miter lim="8000"/>
-            <a:headEnd len="sm" w="sm" type="none"/>
-            <a:tailEnd len="sm" w="sm" type="none"/>
-          </a:ln>
-        </p:spPr>
-      </p:cxnSp>
-      <p:cxnSp>
-        <p:nvCxnSpPr>
-          <p:cNvPr id="276" name="Google Shape;276;p20"/>
-          <p:cNvCxnSpPr/>
-          <p:nvPr/>
-        </p:nvCxnSpPr>
-        <p:spPr>
-          <a:xfrm rot="10800000">
-            <a:off x="6529392" y="-4764"/>
-            <a:ext cx="5662604" cy="931974"/>
-          </a:xfrm>
-          <a:prstGeom prst="straightConnector1">
-            <a:avLst/>
-          </a:prstGeom>
-          <a:noFill/>
-          <a:ln cap="flat" cmpd="sng" w="12700">
-            <a:solidFill>
-              <a:srgbClr val="BA9CA0">
-                <a:alpha val="69803"/>
-              </a:srgbClr>
-            </a:solidFill>
-            <a:prstDash val="solid"/>
-            <a:miter lim="8000"/>
-            <a:headEnd len="sm" w="sm" type="none"/>
-            <a:tailEnd len="sm" w="sm" type="none"/>
-          </a:ln>
-        </p:spPr>
-      </p:cxnSp>
-      <p:cxnSp>
-        <p:nvCxnSpPr>
-          <p:cNvPr id="277" name="Google Shape;277;p20"/>
-          <p:cNvCxnSpPr/>
-          <p:nvPr/>
-        </p:nvCxnSpPr>
-        <p:spPr>
-          <a:xfrm flipH="1">
-            <a:off x="0" y="0"/>
-            <a:ext cx="7289971" cy="1338946"/>
-          </a:xfrm>
-          <a:prstGeom prst="straightConnector1">
-            <a:avLst/>
-          </a:prstGeom>
-          <a:noFill/>
-          <a:ln cap="flat" cmpd="sng" w="12700">
-            <a:solidFill>
-              <a:srgbClr val="BA9CA0">
-                <a:alpha val="69803"/>
-              </a:srgbClr>
-            </a:solidFill>
-            <a:prstDash val="solid"/>
-            <a:miter lim="8000"/>
-            <a:headEnd len="sm" w="sm" type="none"/>
-            <a:tailEnd len="sm" w="sm" type="none"/>
-          </a:ln>
-        </p:spPr>
-      </p:cxnSp>
-      <p:cxnSp>
-        <p:nvCxnSpPr>
-          <p:cNvPr id="278" name="Google Shape;278;p20"/>
-          <p:cNvCxnSpPr/>
-          <p:nvPr/>
-        </p:nvCxnSpPr>
-        <p:spPr>
-          <a:xfrm flipH="1">
-            <a:off x="660992" y="0"/>
-            <a:ext cx="863011" cy="4850297"/>
-          </a:xfrm>
-          <a:prstGeom prst="straightConnector1">
-            <a:avLst/>
-          </a:prstGeom>
-          <a:noFill/>
-          <a:ln cap="flat" cmpd="sng" w="12700">
-            <a:solidFill>
-              <a:srgbClr val="BA9CA0">
-                <a:alpha val="69803"/>
-              </a:srgbClr>
-            </a:solidFill>
-            <a:prstDash val="solid"/>
-            <a:miter lim="8000"/>
-            <a:headEnd len="sm" w="sm" type="none"/>
-            <a:tailEnd len="sm" w="sm" type="none"/>
-          </a:ln>
-        </p:spPr>
-      </p:cxnSp>
-      <p:cxnSp>
-        <p:nvCxnSpPr>
-          <p:cNvPr id="279" name="Google Shape;279;p20"/>
-          <p:cNvCxnSpPr/>
-          <p:nvPr/>
-        </p:nvCxnSpPr>
-        <p:spPr>
-          <a:xfrm>
-            <a:off x="0" y="3632371"/>
-            <a:ext cx="3875309" cy="1195478"/>
-          </a:xfrm>
-          <a:prstGeom prst="straightConnector1">
-            <a:avLst/>
-          </a:prstGeom>
-          <a:noFill/>
-          <a:ln cap="flat" cmpd="sng" w="12700">
-            <a:solidFill>
-              <a:srgbClr val="BA9CA0">
-                <a:alpha val="69803"/>
-              </a:srgbClr>
-            </a:solidFill>
-            <a:prstDash val="solid"/>
-            <a:miter lim="8000"/>
-            <a:headEnd len="sm" w="sm" type="none"/>
-            <a:tailEnd len="sm" w="sm" type="none"/>
-          </a:ln>
-        </p:spPr>
-      </p:cxnSp>
-      <p:cxnSp>
-        <p:nvCxnSpPr>
-          <p:cNvPr id="280" name="Google Shape;280;p20"/>
-          <p:cNvCxnSpPr/>
-          <p:nvPr/>
-        </p:nvCxnSpPr>
-        <p:spPr>
-          <a:xfrm flipH="1">
-            <a:off x="10763621" y="1392868"/>
-            <a:ext cx="1428375" cy="3457429"/>
-          </a:xfrm>
-          <a:prstGeom prst="straightConnector1">
-            <a:avLst/>
-          </a:prstGeom>
-          <a:noFill/>
-          <a:ln cap="flat" cmpd="sng" w="12700">
-            <a:solidFill>
-              <a:srgbClr val="BA9CA0">
-                <a:alpha val="69803"/>
-              </a:srgbClr>
-            </a:solidFill>
-            <a:prstDash val="solid"/>
-            <a:miter lim="8000"/>
-            <a:headEnd len="sm" w="sm" type="none"/>
-            <a:tailEnd len="sm" w="sm" type="none"/>
-          </a:ln>
-        </p:spPr>
-      </p:cxnSp>
-      <p:cxnSp>
-        <p:nvCxnSpPr>
-          <p:cNvPr id="281" name="Google Shape;281;p20"/>
           <p:cNvCxnSpPr/>
           <p:nvPr/>
         </p:nvCxnSpPr>

</xml_diff>